<commit_message>
Form outline for presentation using notes
</commit_message>
<xml_diff>
--- a/Resources/Final.Presentation.pptx
+++ b/Resources/Final.Presentation.pptx
@@ -5,13 +5,19 @@
     <p:sldMasterId id="2147483673" r:id="rId1"/>
   </p:sldMasterIdLst>
   <p:notesMasterIdLst>
-    <p:notesMasterId r:id="rId6"/>
+    <p:notesMasterId r:id="rId12"/>
   </p:notesMasterIdLst>
   <p:sldIdLst>
     <p:sldId id="256" r:id="rId2"/>
     <p:sldId id="257" r:id="rId3"/>
     <p:sldId id="258" r:id="rId4"/>
     <p:sldId id="259" r:id="rId5"/>
+    <p:sldId id="260" r:id="rId6"/>
+    <p:sldId id="261" r:id="rId7"/>
+    <p:sldId id="262" r:id="rId8"/>
+    <p:sldId id="263" r:id="rId9"/>
+    <p:sldId id="264" r:id="rId10"/>
+    <p:sldId id="265" r:id="rId11"/>
   </p:sldIdLst>
   <p:sldSz cx="12192000" cy="6858000"/>
   <p:notesSz cx="6858000" cy="9144000"/>
@@ -131,7 +137,7 @@
   <pc:docChgLst>
     <pc:chgData name="Taryn Syler" userId="d093462dc93fe5e1" providerId="LiveId" clId="{2D2F4B00-D67B-471E-8EC5-16430E5C6708}"/>
     <pc:docChg chg="undo custSel addSld modSld">
-      <pc:chgData name="Taryn Syler" userId="d093462dc93fe5e1" providerId="LiveId" clId="{2D2F4B00-D67B-471E-8EC5-16430E5C6708}" dt="2021-10-25T04:22:10.716" v="1955" actId="26606"/>
+      <pc:chgData name="Taryn Syler" userId="d093462dc93fe5e1" providerId="LiveId" clId="{2D2F4B00-D67B-471E-8EC5-16430E5C6708}" dt="2021-11-01T05:38:04.792" v="2313" actId="20577"/>
       <pc:docMkLst>
         <pc:docMk/>
       </pc:docMkLst>
@@ -324,6 +330,48 @@
           </ac:picMkLst>
         </pc:picChg>
       </pc:sldChg>
+      <pc:sldChg chg="new modNotesTx">
+        <pc:chgData name="Taryn Syler" userId="d093462dc93fe5e1" providerId="LiveId" clId="{2D2F4B00-D67B-471E-8EC5-16430E5C6708}" dt="2021-11-01T05:32:32.908" v="2024" actId="20577"/>
+        <pc:sldMkLst>
+          <pc:docMk/>
+          <pc:sldMk cId="2730496532" sldId="260"/>
+        </pc:sldMkLst>
+      </pc:sldChg>
+      <pc:sldChg chg="new modNotesTx">
+        <pc:chgData name="Taryn Syler" userId="d093462dc93fe5e1" providerId="LiveId" clId="{2D2F4B00-D67B-471E-8EC5-16430E5C6708}" dt="2021-11-01T05:36:44.853" v="2086" actId="20577"/>
+        <pc:sldMkLst>
+          <pc:docMk/>
+          <pc:sldMk cId="933643513" sldId="261"/>
+        </pc:sldMkLst>
+      </pc:sldChg>
+      <pc:sldChg chg="new modNotesTx">
+        <pc:chgData name="Taryn Syler" userId="d093462dc93fe5e1" providerId="LiveId" clId="{2D2F4B00-D67B-471E-8EC5-16430E5C6708}" dt="2021-11-01T05:37:18.958" v="2181" actId="20577"/>
+        <pc:sldMkLst>
+          <pc:docMk/>
+          <pc:sldMk cId="2869901700" sldId="262"/>
+        </pc:sldMkLst>
+      </pc:sldChg>
+      <pc:sldChg chg="new modNotesTx">
+        <pc:chgData name="Taryn Syler" userId="d093462dc93fe5e1" providerId="LiveId" clId="{2D2F4B00-D67B-471E-8EC5-16430E5C6708}" dt="2021-11-01T05:37:28.766" v="2203" actId="20577"/>
+        <pc:sldMkLst>
+          <pc:docMk/>
+          <pc:sldMk cId="642101144" sldId="263"/>
+        </pc:sldMkLst>
+      </pc:sldChg>
+      <pc:sldChg chg="new modNotesTx">
+        <pc:chgData name="Taryn Syler" userId="d093462dc93fe5e1" providerId="LiveId" clId="{2D2F4B00-D67B-471E-8EC5-16430E5C6708}" dt="2021-11-01T05:37:41.749" v="2240" actId="20577"/>
+        <pc:sldMkLst>
+          <pc:docMk/>
+          <pc:sldMk cId="1993694396" sldId="264"/>
+        </pc:sldMkLst>
+      </pc:sldChg>
+      <pc:sldChg chg="new modNotesTx">
+        <pc:chgData name="Taryn Syler" userId="d093462dc93fe5e1" providerId="LiveId" clId="{2D2F4B00-D67B-471E-8EC5-16430E5C6708}" dt="2021-11-01T05:38:04.792" v="2313" actId="20577"/>
+        <pc:sldMkLst>
+          <pc:docMk/>
+          <pc:sldMk cId="1302545605" sldId="265"/>
+        </pc:sldMkLst>
+      </pc:sldChg>
     </pc:docChg>
   </pc:docChgLst>
 </pc:chgInfo>
@@ -411,7 +459,7 @@
           <a:p>
             <a:fld id="{917E58E4-3C21-4D5C-B4E1-FAE723A9F180}" type="datetimeFigureOut">
               <a:rPr lang="en-US" smtClean="0"/>
-              <a:t>10/24/2021</a:t>
+              <a:t>10/31/2021</a:t>
             </a:fld>
             <a:endParaRPr lang="en-US"/>
           </a:p>
@@ -975,6 +1023,532 @@
 </p:notes>
 </file>
 
+<file path=ppt/notesSlides/notesSlide4.xml><?xml version="1.0" encoding="utf-8"?>
+<p:notes xmlns:a="http://schemas.openxmlformats.org/drawingml/2006/main" xmlns:r="http://schemas.openxmlformats.org/officeDocument/2006/relationships" xmlns:p="http://schemas.openxmlformats.org/presentationml/2006/main">
+  <p:cSld>
+    <p:spTree>
+      <p:nvGrpSpPr>
+        <p:cNvPr id="1" name=""/>
+        <p:cNvGrpSpPr/>
+        <p:nvPr/>
+      </p:nvGrpSpPr>
+      <p:grpSpPr>
+        <a:xfrm>
+          <a:off x="0" y="0"/>
+          <a:ext cx="0" cy="0"/>
+          <a:chOff x="0" y="0"/>
+          <a:chExt cx="0" cy="0"/>
+        </a:xfrm>
+      </p:grpSpPr>
+      <p:sp>
+        <p:nvSpPr>
+          <p:cNvPr id="2" name="Slide Image Placeholder 1"/>
+          <p:cNvSpPr>
+            <a:spLocks noGrp="1" noRot="1" noChangeAspect="1"/>
+          </p:cNvSpPr>
+          <p:nvPr>
+            <p:ph type="sldImg"/>
+          </p:nvPr>
+        </p:nvSpPr>
+        <p:spPr/>
+      </p:sp>
+      <p:sp>
+        <p:nvSpPr>
+          <p:cNvPr id="3" name="Notes Placeholder 2"/>
+          <p:cNvSpPr>
+            <a:spLocks noGrp="1"/>
+          </p:cNvSpPr>
+          <p:nvPr>
+            <p:ph type="body" idx="1"/>
+          </p:nvPr>
+        </p:nvSpPr>
+        <p:spPr/>
+        <p:txBody>
+          <a:bodyPr/>
+          <a:lstStyle/>
+          <a:p>
+            <a:r>
+              <a:rPr lang="en-US" dirty="0"/>
+              <a:t>Description of the data exploration phase of the project: </a:t>
+            </a:r>
+          </a:p>
+        </p:txBody>
+      </p:sp>
+      <p:sp>
+        <p:nvSpPr>
+          <p:cNvPr id="4" name="Slide Number Placeholder 3"/>
+          <p:cNvSpPr>
+            <a:spLocks noGrp="1"/>
+          </p:cNvSpPr>
+          <p:nvPr>
+            <p:ph type="sldNum" sz="quarter" idx="5"/>
+          </p:nvPr>
+        </p:nvSpPr>
+        <p:spPr/>
+        <p:txBody>
+          <a:bodyPr/>
+          <a:lstStyle/>
+          <a:p>
+            <a:fld id="{8382AD83-B5DF-4BD6-AC2B-95FF0DEC3221}" type="slidenum">
+              <a:rPr lang="en-US" smtClean="0"/>
+              <a:t>5</a:t>
+            </a:fld>
+            <a:endParaRPr lang="en-US"/>
+          </a:p>
+        </p:txBody>
+      </p:sp>
+    </p:spTree>
+    <p:extLst>
+      <p:ext uri="{BB962C8B-B14F-4D97-AF65-F5344CB8AC3E}">
+        <p14:creationId xmlns:p14="http://schemas.microsoft.com/office/powerpoint/2010/main" val="2428260531"/>
+      </p:ext>
+    </p:extLst>
+  </p:cSld>
+  <p:clrMapOvr>
+    <a:masterClrMapping/>
+  </p:clrMapOvr>
+</p:notes>
+</file>
+
+<file path=ppt/notesSlides/notesSlide5.xml><?xml version="1.0" encoding="utf-8"?>
+<p:notes xmlns:a="http://schemas.openxmlformats.org/drawingml/2006/main" xmlns:r="http://schemas.openxmlformats.org/officeDocument/2006/relationships" xmlns:p="http://schemas.openxmlformats.org/presentationml/2006/main">
+  <p:cSld>
+    <p:spTree>
+      <p:nvGrpSpPr>
+        <p:cNvPr id="1" name=""/>
+        <p:cNvGrpSpPr/>
+        <p:nvPr/>
+      </p:nvGrpSpPr>
+      <p:grpSpPr>
+        <a:xfrm>
+          <a:off x="0" y="0"/>
+          <a:ext cx="0" cy="0"/>
+          <a:chOff x="0" y="0"/>
+          <a:chExt cx="0" cy="0"/>
+        </a:xfrm>
+      </p:grpSpPr>
+      <p:sp>
+        <p:nvSpPr>
+          <p:cNvPr id="2" name="Slide Image Placeholder 1"/>
+          <p:cNvSpPr>
+            <a:spLocks noGrp="1" noRot="1" noChangeAspect="1"/>
+          </p:cNvSpPr>
+          <p:nvPr>
+            <p:ph type="sldImg"/>
+          </p:nvPr>
+        </p:nvSpPr>
+        <p:spPr/>
+      </p:sp>
+      <p:sp>
+        <p:nvSpPr>
+          <p:cNvPr id="3" name="Notes Placeholder 2"/>
+          <p:cNvSpPr>
+            <a:spLocks noGrp="1"/>
+          </p:cNvSpPr>
+          <p:nvPr>
+            <p:ph type="body" idx="1"/>
+          </p:nvPr>
+        </p:nvSpPr>
+        <p:spPr/>
+        <p:txBody>
+          <a:bodyPr/>
+          <a:lstStyle/>
+          <a:p>
+            <a:r>
+              <a:rPr lang="en-US" dirty="0"/>
+              <a:t>Description of the analysis phase of the project:</a:t>
+            </a:r>
+          </a:p>
+        </p:txBody>
+      </p:sp>
+      <p:sp>
+        <p:nvSpPr>
+          <p:cNvPr id="4" name="Slide Number Placeholder 3"/>
+          <p:cNvSpPr>
+            <a:spLocks noGrp="1"/>
+          </p:cNvSpPr>
+          <p:nvPr>
+            <p:ph type="sldNum" sz="quarter" idx="5"/>
+          </p:nvPr>
+        </p:nvSpPr>
+        <p:spPr/>
+        <p:txBody>
+          <a:bodyPr/>
+          <a:lstStyle/>
+          <a:p>
+            <a:fld id="{8382AD83-B5DF-4BD6-AC2B-95FF0DEC3221}" type="slidenum">
+              <a:rPr lang="en-US" smtClean="0"/>
+              <a:t>6</a:t>
+            </a:fld>
+            <a:endParaRPr lang="en-US"/>
+          </a:p>
+        </p:txBody>
+      </p:sp>
+    </p:spTree>
+    <p:extLst>
+      <p:ext uri="{BB962C8B-B14F-4D97-AF65-F5344CB8AC3E}">
+        <p14:creationId xmlns:p14="http://schemas.microsoft.com/office/powerpoint/2010/main" val="207807768"/>
+      </p:ext>
+    </p:extLst>
+  </p:cSld>
+  <p:clrMapOvr>
+    <a:masterClrMapping/>
+  </p:clrMapOvr>
+</p:notes>
+</file>
+
+<file path=ppt/notesSlides/notesSlide6.xml><?xml version="1.0" encoding="utf-8"?>
+<p:notes xmlns:a="http://schemas.openxmlformats.org/drawingml/2006/main" xmlns:r="http://schemas.openxmlformats.org/officeDocument/2006/relationships" xmlns:p="http://schemas.openxmlformats.org/presentationml/2006/main">
+  <p:cSld>
+    <p:spTree>
+      <p:nvGrpSpPr>
+        <p:cNvPr id="1" name=""/>
+        <p:cNvGrpSpPr/>
+        <p:nvPr/>
+      </p:nvGrpSpPr>
+      <p:grpSpPr>
+        <a:xfrm>
+          <a:off x="0" y="0"/>
+          <a:ext cx="0" cy="0"/>
+          <a:chOff x="0" y="0"/>
+          <a:chExt cx="0" cy="0"/>
+        </a:xfrm>
+      </p:grpSpPr>
+      <p:sp>
+        <p:nvSpPr>
+          <p:cNvPr id="2" name="Slide Image Placeholder 1"/>
+          <p:cNvSpPr>
+            <a:spLocks noGrp="1" noRot="1" noChangeAspect="1"/>
+          </p:cNvSpPr>
+          <p:nvPr>
+            <p:ph type="sldImg"/>
+          </p:nvPr>
+        </p:nvSpPr>
+        <p:spPr/>
+      </p:sp>
+      <p:sp>
+        <p:nvSpPr>
+          <p:cNvPr id="3" name="Notes Placeholder 2"/>
+          <p:cNvSpPr>
+            <a:spLocks noGrp="1"/>
+          </p:cNvSpPr>
+          <p:nvPr>
+            <p:ph type="body" idx="1"/>
+          </p:nvPr>
+        </p:nvSpPr>
+        <p:spPr/>
+        <p:txBody>
+          <a:bodyPr/>
+          <a:lstStyle/>
+          <a:p>
+            <a:r>
+              <a:rPr lang="en-US" dirty="0"/>
+              <a:t>Technologies, languages, tools, and algorithms used throughout the project: </a:t>
+            </a:r>
+          </a:p>
+        </p:txBody>
+      </p:sp>
+      <p:sp>
+        <p:nvSpPr>
+          <p:cNvPr id="4" name="Slide Number Placeholder 3"/>
+          <p:cNvSpPr>
+            <a:spLocks noGrp="1"/>
+          </p:cNvSpPr>
+          <p:nvPr>
+            <p:ph type="sldNum" sz="quarter" idx="5"/>
+          </p:nvPr>
+        </p:nvSpPr>
+        <p:spPr/>
+        <p:txBody>
+          <a:bodyPr/>
+          <a:lstStyle/>
+          <a:p>
+            <a:fld id="{8382AD83-B5DF-4BD6-AC2B-95FF0DEC3221}" type="slidenum">
+              <a:rPr lang="en-US" smtClean="0"/>
+              <a:t>7</a:t>
+            </a:fld>
+            <a:endParaRPr lang="en-US"/>
+          </a:p>
+        </p:txBody>
+      </p:sp>
+    </p:spTree>
+    <p:extLst>
+      <p:ext uri="{BB962C8B-B14F-4D97-AF65-F5344CB8AC3E}">
+        <p14:creationId xmlns:p14="http://schemas.microsoft.com/office/powerpoint/2010/main" val="4045243988"/>
+      </p:ext>
+    </p:extLst>
+  </p:cSld>
+  <p:clrMapOvr>
+    <a:masterClrMapping/>
+  </p:clrMapOvr>
+</p:notes>
+</file>
+
+<file path=ppt/notesSlides/notesSlide7.xml><?xml version="1.0" encoding="utf-8"?>
+<p:notes xmlns:a="http://schemas.openxmlformats.org/drawingml/2006/main" xmlns:r="http://schemas.openxmlformats.org/officeDocument/2006/relationships" xmlns:p="http://schemas.openxmlformats.org/presentationml/2006/main">
+  <p:cSld>
+    <p:spTree>
+      <p:nvGrpSpPr>
+        <p:cNvPr id="1" name=""/>
+        <p:cNvGrpSpPr/>
+        <p:nvPr/>
+      </p:nvGrpSpPr>
+      <p:grpSpPr>
+        <a:xfrm>
+          <a:off x="0" y="0"/>
+          <a:ext cx="0" cy="0"/>
+          <a:chOff x="0" y="0"/>
+          <a:chExt cx="0" cy="0"/>
+        </a:xfrm>
+      </p:grpSpPr>
+      <p:sp>
+        <p:nvSpPr>
+          <p:cNvPr id="2" name="Slide Image Placeholder 1"/>
+          <p:cNvSpPr>
+            <a:spLocks noGrp="1" noRot="1" noChangeAspect="1"/>
+          </p:cNvSpPr>
+          <p:nvPr>
+            <p:ph type="sldImg"/>
+          </p:nvPr>
+        </p:nvSpPr>
+        <p:spPr/>
+      </p:sp>
+      <p:sp>
+        <p:nvSpPr>
+          <p:cNvPr id="3" name="Notes Placeholder 2"/>
+          <p:cNvSpPr>
+            <a:spLocks noGrp="1"/>
+          </p:cNvSpPr>
+          <p:nvPr>
+            <p:ph type="body" idx="1"/>
+          </p:nvPr>
+        </p:nvSpPr>
+        <p:spPr/>
+        <p:txBody>
+          <a:bodyPr/>
+          <a:lstStyle/>
+          <a:p>
+            <a:r>
+              <a:rPr lang="en-US" dirty="0"/>
+              <a:t>Result of analysis:</a:t>
+            </a:r>
+          </a:p>
+        </p:txBody>
+      </p:sp>
+      <p:sp>
+        <p:nvSpPr>
+          <p:cNvPr id="4" name="Slide Number Placeholder 3"/>
+          <p:cNvSpPr>
+            <a:spLocks noGrp="1"/>
+          </p:cNvSpPr>
+          <p:nvPr>
+            <p:ph type="sldNum" sz="quarter" idx="5"/>
+          </p:nvPr>
+        </p:nvSpPr>
+        <p:spPr/>
+        <p:txBody>
+          <a:bodyPr/>
+          <a:lstStyle/>
+          <a:p>
+            <a:fld id="{8382AD83-B5DF-4BD6-AC2B-95FF0DEC3221}" type="slidenum">
+              <a:rPr lang="en-US" smtClean="0"/>
+              <a:t>8</a:t>
+            </a:fld>
+            <a:endParaRPr lang="en-US"/>
+          </a:p>
+        </p:txBody>
+      </p:sp>
+    </p:spTree>
+    <p:extLst>
+      <p:ext uri="{BB962C8B-B14F-4D97-AF65-F5344CB8AC3E}">
+        <p14:creationId xmlns:p14="http://schemas.microsoft.com/office/powerpoint/2010/main" val="2296447071"/>
+      </p:ext>
+    </p:extLst>
+  </p:cSld>
+  <p:clrMapOvr>
+    <a:masterClrMapping/>
+  </p:clrMapOvr>
+</p:notes>
+</file>
+
+<file path=ppt/notesSlides/notesSlide8.xml><?xml version="1.0" encoding="utf-8"?>
+<p:notes xmlns:a="http://schemas.openxmlformats.org/drawingml/2006/main" xmlns:r="http://schemas.openxmlformats.org/officeDocument/2006/relationships" xmlns:p="http://schemas.openxmlformats.org/presentationml/2006/main">
+  <p:cSld>
+    <p:spTree>
+      <p:nvGrpSpPr>
+        <p:cNvPr id="1" name=""/>
+        <p:cNvGrpSpPr/>
+        <p:nvPr/>
+      </p:nvGrpSpPr>
+      <p:grpSpPr>
+        <a:xfrm>
+          <a:off x="0" y="0"/>
+          <a:ext cx="0" cy="0"/>
+          <a:chOff x="0" y="0"/>
+          <a:chExt cx="0" cy="0"/>
+        </a:xfrm>
+      </p:grpSpPr>
+      <p:sp>
+        <p:nvSpPr>
+          <p:cNvPr id="2" name="Slide Image Placeholder 1"/>
+          <p:cNvSpPr>
+            <a:spLocks noGrp="1" noRot="1" noChangeAspect="1"/>
+          </p:cNvSpPr>
+          <p:nvPr>
+            <p:ph type="sldImg"/>
+          </p:nvPr>
+        </p:nvSpPr>
+        <p:spPr/>
+      </p:sp>
+      <p:sp>
+        <p:nvSpPr>
+          <p:cNvPr id="3" name="Notes Placeholder 2"/>
+          <p:cNvSpPr>
+            <a:spLocks noGrp="1"/>
+          </p:cNvSpPr>
+          <p:nvPr>
+            <p:ph type="body" idx="1"/>
+          </p:nvPr>
+        </p:nvSpPr>
+        <p:spPr/>
+        <p:txBody>
+          <a:bodyPr/>
+          <a:lstStyle/>
+          <a:p>
+            <a:r>
+              <a:rPr lang="en-US" dirty="0"/>
+              <a:t>Recommendation for future analysis: </a:t>
+            </a:r>
+          </a:p>
+        </p:txBody>
+      </p:sp>
+      <p:sp>
+        <p:nvSpPr>
+          <p:cNvPr id="4" name="Slide Number Placeholder 3"/>
+          <p:cNvSpPr>
+            <a:spLocks noGrp="1"/>
+          </p:cNvSpPr>
+          <p:nvPr>
+            <p:ph type="sldNum" sz="quarter" idx="5"/>
+          </p:nvPr>
+        </p:nvSpPr>
+        <p:spPr/>
+        <p:txBody>
+          <a:bodyPr/>
+          <a:lstStyle/>
+          <a:p>
+            <a:fld id="{8382AD83-B5DF-4BD6-AC2B-95FF0DEC3221}" type="slidenum">
+              <a:rPr lang="en-US" smtClean="0"/>
+              <a:t>9</a:t>
+            </a:fld>
+            <a:endParaRPr lang="en-US"/>
+          </a:p>
+        </p:txBody>
+      </p:sp>
+    </p:spTree>
+    <p:extLst>
+      <p:ext uri="{BB962C8B-B14F-4D97-AF65-F5344CB8AC3E}">
+        <p14:creationId xmlns:p14="http://schemas.microsoft.com/office/powerpoint/2010/main" val="1659576050"/>
+      </p:ext>
+    </p:extLst>
+  </p:cSld>
+  <p:clrMapOvr>
+    <a:masterClrMapping/>
+  </p:clrMapOvr>
+</p:notes>
+</file>
+
+<file path=ppt/notesSlides/notesSlide9.xml><?xml version="1.0" encoding="utf-8"?>
+<p:notes xmlns:a="http://schemas.openxmlformats.org/drawingml/2006/main" xmlns:r="http://schemas.openxmlformats.org/officeDocument/2006/relationships" xmlns:p="http://schemas.openxmlformats.org/presentationml/2006/main">
+  <p:cSld>
+    <p:spTree>
+      <p:nvGrpSpPr>
+        <p:cNvPr id="1" name=""/>
+        <p:cNvGrpSpPr/>
+        <p:nvPr/>
+      </p:nvGrpSpPr>
+      <p:grpSpPr>
+        <a:xfrm>
+          <a:off x="0" y="0"/>
+          <a:ext cx="0" cy="0"/>
+          <a:chOff x="0" y="0"/>
+          <a:chExt cx="0" cy="0"/>
+        </a:xfrm>
+      </p:grpSpPr>
+      <p:sp>
+        <p:nvSpPr>
+          <p:cNvPr id="2" name="Slide Image Placeholder 1"/>
+          <p:cNvSpPr>
+            <a:spLocks noGrp="1" noRot="1" noChangeAspect="1"/>
+          </p:cNvSpPr>
+          <p:nvPr>
+            <p:ph type="sldImg"/>
+          </p:nvPr>
+        </p:nvSpPr>
+        <p:spPr/>
+      </p:sp>
+      <p:sp>
+        <p:nvSpPr>
+          <p:cNvPr id="3" name="Notes Placeholder 2"/>
+          <p:cNvSpPr>
+            <a:spLocks noGrp="1"/>
+          </p:cNvSpPr>
+          <p:nvPr>
+            <p:ph type="body" idx="1"/>
+          </p:nvPr>
+        </p:nvSpPr>
+        <p:spPr/>
+        <p:txBody>
+          <a:bodyPr/>
+          <a:lstStyle/>
+          <a:p>
+            <a:r>
+              <a:rPr lang="en-US" dirty="0"/>
+              <a:t>Anything the team would have </a:t>
+            </a:r>
+            <a:r>
+              <a:rPr lang="en-US"/>
+              <a:t>done differently:</a:t>
+            </a:r>
+          </a:p>
+        </p:txBody>
+      </p:sp>
+      <p:sp>
+        <p:nvSpPr>
+          <p:cNvPr id="4" name="Slide Number Placeholder 3"/>
+          <p:cNvSpPr>
+            <a:spLocks noGrp="1"/>
+          </p:cNvSpPr>
+          <p:nvPr>
+            <p:ph type="sldNum" sz="quarter" idx="5"/>
+          </p:nvPr>
+        </p:nvSpPr>
+        <p:spPr/>
+        <p:txBody>
+          <a:bodyPr/>
+          <a:lstStyle/>
+          <a:p>
+            <a:fld id="{8382AD83-B5DF-4BD6-AC2B-95FF0DEC3221}" type="slidenum">
+              <a:rPr lang="en-US" smtClean="0"/>
+              <a:t>10</a:t>
+            </a:fld>
+            <a:endParaRPr lang="en-US"/>
+          </a:p>
+        </p:txBody>
+      </p:sp>
+    </p:spTree>
+    <p:extLst>
+      <p:ext uri="{BB962C8B-B14F-4D97-AF65-F5344CB8AC3E}">
+        <p14:creationId xmlns:p14="http://schemas.microsoft.com/office/powerpoint/2010/main" val="1968929199"/>
+      </p:ext>
+    </p:extLst>
+  </p:cSld>
+  <p:clrMapOvr>
+    <a:masterClrMapping/>
+  </p:clrMapOvr>
+</p:notes>
+</file>
+
 <file path=ppt/slideLayouts/slideLayout1.xml><?xml version="1.0" encoding="utf-8"?>
 <p:sldLayout xmlns:a="http://schemas.openxmlformats.org/drawingml/2006/main" xmlns:r="http://schemas.openxmlformats.org/officeDocument/2006/relationships" xmlns:p="http://schemas.openxmlformats.org/presentationml/2006/main" showMasterSp="0" type="title" preserve="1">
   <p:cSld name="Title Slide">
@@ -1197,7 +1771,7 @@
             <a:fld id="{A37D6D71-8B28-4ED6-B932-04B197003D23}" type="datetimeFigureOut">
               <a:rPr lang="en-US" smtClean="0"/>
               <a:pPr algn="r"/>
-              <a:t>10/24/2021</a:t>
+              <a:t>10/31/2021</a:t>
             </a:fld>
             <a:endParaRPr lang="en-US" dirty="0"/>
           </a:p>
@@ -1419,7 +1993,7 @@
             <a:fld id="{A37D6D71-8B28-4ED6-B932-04B197003D23}" type="datetimeFigureOut">
               <a:rPr lang="en-US" smtClean="0"/>
               <a:pPr algn="r"/>
-              <a:t>10/24/2021</a:t>
+              <a:t>10/31/2021</a:t>
             </a:fld>
             <a:endParaRPr lang="en-US" dirty="0"/>
           </a:p>
@@ -1702,7 +2276,7 @@
             <a:fld id="{A37D6D71-8B28-4ED6-B932-04B197003D23}" type="datetimeFigureOut">
               <a:rPr lang="en-US" smtClean="0"/>
               <a:pPr algn="r"/>
-              <a:t>10/24/2021</a:t>
+              <a:t>10/31/2021</a:t>
             </a:fld>
             <a:endParaRPr lang="en-US" dirty="0"/>
           </a:p>
@@ -1916,7 +2490,7 @@
             <a:fld id="{A37D6D71-8B28-4ED6-B932-04B197003D23}" type="datetimeFigureOut">
               <a:rPr lang="en-US" smtClean="0"/>
               <a:pPr algn="r"/>
-              <a:t>10/24/2021</a:t>
+              <a:t>10/31/2021</a:t>
             </a:fld>
             <a:endParaRPr lang="en-US" dirty="0"/>
           </a:p>
@@ -2254,7 +2828,7 @@
             <a:fld id="{A37D6D71-8B28-4ED6-B932-04B197003D23}" type="datetimeFigureOut">
               <a:rPr lang="en-US" smtClean="0"/>
               <a:pPr algn="r"/>
-              <a:t>10/24/2021</a:t>
+              <a:t>10/31/2021</a:t>
             </a:fld>
             <a:endParaRPr lang="en-US" dirty="0"/>
           </a:p>
@@ -2529,7 +3103,7 @@
             <a:fld id="{A37D6D71-8B28-4ED6-B932-04B197003D23}" type="datetimeFigureOut">
               <a:rPr lang="en-US" smtClean="0"/>
               <a:pPr algn="r"/>
-              <a:t>10/24/2021</a:t>
+              <a:t>10/31/2021</a:t>
             </a:fld>
             <a:endParaRPr lang="en-US" dirty="0"/>
           </a:p>
@@ -2918,7 +3492,7 @@
             <a:fld id="{A37D6D71-8B28-4ED6-B932-04B197003D23}" type="datetimeFigureOut">
               <a:rPr lang="en-US" smtClean="0"/>
               <a:pPr algn="r"/>
-              <a:t>10/24/2021</a:t>
+              <a:t>10/31/2021</a:t>
             </a:fld>
             <a:endParaRPr lang="en-US" dirty="0"/>
           </a:p>
@@ -3095,7 +3669,7 @@
             <a:fld id="{A37D6D71-8B28-4ED6-B932-04B197003D23}" type="datetimeFigureOut">
               <a:rPr lang="en-US" smtClean="0"/>
               <a:pPr algn="r"/>
-              <a:t>10/24/2021</a:t>
+              <a:t>10/31/2021</a:t>
             </a:fld>
             <a:endParaRPr lang="en-US" dirty="0"/>
           </a:p>
@@ -3216,7 +3790,7 @@
             <a:fld id="{A37D6D71-8B28-4ED6-B932-04B197003D23}" type="datetimeFigureOut">
               <a:rPr lang="en-US" smtClean="0"/>
               <a:pPr algn="r"/>
-              <a:t>10/24/2021</a:t>
+              <a:t>10/31/2021</a:t>
             </a:fld>
             <a:endParaRPr lang="en-US" dirty="0"/>
           </a:p>
@@ -3501,7 +4075,7 @@
             <a:fld id="{A37D6D71-8B28-4ED6-B932-04B197003D23}" type="datetimeFigureOut">
               <a:rPr lang="en-US" smtClean="0"/>
               <a:pPr algn="r"/>
-              <a:t>10/24/2021</a:t>
+              <a:t>10/31/2021</a:t>
             </a:fld>
             <a:endParaRPr lang="en-US" dirty="0"/>
           </a:p>
@@ -3802,7 +4376,7 @@
             <a:fld id="{A37D6D71-8B28-4ED6-B932-04B197003D23}" type="datetimeFigureOut">
               <a:rPr lang="en-US" smtClean="0"/>
               <a:pPr algn="r"/>
-              <a:t>10/24/2021</a:t>
+              <a:t>10/31/2021</a:t>
             </a:fld>
             <a:endParaRPr lang="en-US" dirty="0"/>
           </a:p>
@@ -4150,7 +4724,7 @@
             <a:fld id="{A37D6D71-8B28-4ED6-B932-04B197003D23}" type="datetimeFigureOut">
               <a:rPr lang="en-US" smtClean="0"/>
               <a:pPr algn="r"/>
-              <a:t>10/24/2021</a:t>
+              <a:t>10/31/2021</a:t>
             </a:fld>
             <a:endParaRPr lang="en-US" spc="50" dirty="0"/>
           </a:p>
@@ -5049,6 +5623,86 @@
 </p:sld>
 </file>
 
+<file path=ppt/slides/slide10.xml><?xml version="1.0" encoding="utf-8"?>
+<p:sld xmlns:a="http://schemas.openxmlformats.org/drawingml/2006/main" xmlns:r="http://schemas.openxmlformats.org/officeDocument/2006/relationships" xmlns:p="http://schemas.openxmlformats.org/presentationml/2006/main">
+  <p:cSld>
+    <p:spTree>
+      <p:nvGrpSpPr>
+        <p:cNvPr id="1" name=""/>
+        <p:cNvGrpSpPr/>
+        <p:nvPr/>
+      </p:nvGrpSpPr>
+      <p:grpSpPr>
+        <a:xfrm>
+          <a:off x="0" y="0"/>
+          <a:ext cx="0" cy="0"/>
+          <a:chOff x="0" y="0"/>
+          <a:chExt cx="0" cy="0"/>
+        </a:xfrm>
+      </p:grpSpPr>
+      <p:sp>
+        <p:nvSpPr>
+          <p:cNvPr id="2" name="Title 1">
+            <a:extLst>
+              <a:ext uri="{FF2B5EF4-FFF2-40B4-BE49-F238E27FC236}">
+                <a16:creationId xmlns:a16="http://schemas.microsoft.com/office/drawing/2014/main" id="{F7EE706F-D698-4024-BCE4-B57C05976FEF}"/>
+              </a:ext>
+            </a:extLst>
+          </p:cNvPr>
+          <p:cNvSpPr>
+            <a:spLocks noGrp="1"/>
+          </p:cNvSpPr>
+          <p:nvPr>
+            <p:ph type="title"/>
+          </p:nvPr>
+        </p:nvSpPr>
+        <p:spPr/>
+        <p:txBody>
+          <a:bodyPr/>
+          <a:lstStyle/>
+          <a:p>
+            <a:endParaRPr lang="en-US"/>
+          </a:p>
+        </p:txBody>
+      </p:sp>
+      <p:sp>
+        <p:nvSpPr>
+          <p:cNvPr id="3" name="Content Placeholder 2">
+            <a:extLst>
+              <a:ext uri="{FF2B5EF4-FFF2-40B4-BE49-F238E27FC236}">
+                <a16:creationId xmlns:a16="http://schemas.microsoft.com/office/drawing/2014/main" id="{9A15327A-8312-478B-A852-0F2E5BAE44A3}"/>
+              </a:ext>
+            </a:extLst>
+          </p:cNvPr>
+          <p:cNvSpPr>
+            <a:spLocks noGrp="1"/>
+          </p:cNvSpPr>
+          <p:nvPr>
+            <p:ph idx="1"/>
+          </p:nvPr>
+        </p:nvSpPr>
+        <p:spPr/>
+        <p:txBody>
+          <a:bodyPr/>
+          <a:lstStyle/>
+          <a:p>
+            <a:endParaRPr lang="en-US"/>
+          </a:p>
+        </p:txBody>
+      </p:sp>
+    </p:spTree>
+    <p:extLst>
+      <p:ext uri="{BB962C8B-B14F-4D97-AF65-F5344CB8AC3E}">
+        <p14:creationId xmlns:p14="http://schemas.microsoft.com/office/powerpoint/2010/main" val="1302545605"/>
+      </p:ext>
+    </p:extLst>
+  </p:cSld>
+  <p:clrMapOvr>
+    <a:masterClrMapping/>
+  </p:clrMapOvr>
+</p:sld>
+</file>
+
 <file path=ppt/slides/slide2.xml><?xml version="1.0" encoding="utf-8"?>
 <p:sld xmlns:a="http://schemas.openxmlformats.org/drawingml/2006/main" xmlns:r="http://schemas.openxmlformats.org/officeDocument/2006/relationships" xmlns:p="http://schemas.openxmlformats.org/presentationml/2006/main">
   <p:cSld>
@@ -5801,6 +6455,406 @@
     <p:extLst>
       <p:ext uri="{BB962C8B-B14F-4D97-AF65-F5344CB8AC3E}">
         <p14:creationId xmlns:p14="http://schemas.microsoft.com/office/powerpoint/2010/main" val="218487303"/>
+      </p:ext>
+    </p:extLst>
+  </p:cSld>
+  <p:clrMapOvr>
+    <a:masterClrMapping/>
+  </p:clrMapOvr>
+</p:sld>
+</file>
+
+<file path=ppt/slides/slide5.xml><?xml version="1.0" encoding="utf-8"?>
+<p:sld xmlns:a="http://schemas.openxmlformats.org/drawingml/2006/main" xmlns:r="http://schemas.openxmlformats.org/officeDocument/2006/relationships" xmlns:p="http://schemas.openxmlformats.org/presentationml/2006/main">
+  <p:cSld>
+    <p:spTree>
+      <p:nvGrpSpPr>
+        <p:cNvPr id="1" name=""/>
+        <p:cNvGrpSpPr/>
+        <p:nvPr/>
+      </p:nvGrpSpPr>
+      <p:grpSpPr>
+        <a:xfrm>
+          <a:off x="0" y="0"/>
+          <a:ext cx="0" cy="0"/>
+          <a:chOff x="0" y="0"/>
+          <a:chExt cx="0" cy="0"/>
+        </a:xfrm>
+      </p:grpSpPr>
+      <p:sp>
+        <p:nvSpPr>
+          <p:cNvPr id="2" name="Title 1">
+            <a:extLst>
+              <a:ext uri="{FF2B5EF4-FFF2-40B4-BE49-F238E27FC236}">
+                <a16:creationId xmlns:a16="http://schemas.microsoft.com/office/drawing/2014/main" id="{8B9EC104-FCF8-482D-833F-B9BAB79DA61D}"/>
+              </a:ext>
+            </a:extLst>
+          </p:cNvPr>
+          <p:cNvSpPr>
+            <a:spLocks noGrp="1"/>
+          </p:cNvSpPr>
+          <p:nvPr>
+            <p:ph type="title"/>
+          </p:nvPr>
+        </p:nvSpPr>
+        <p:spPr/>
+        <p:txBody>
+          <a:bodyPr/>
+          <a:lstStyle/>
+          <a:p>
+            <a:endParaRPr lang="en-US"/>
+          </a:p>
+        </p:txBody>
+      </p:sp>
+      <p:sp>
+        <p:nvSpPr>
+          <p:cNvPr id="3" name="Content Placeholder 2">
+            <a:extLst>
+              <a:ext uri="{FF2B5EF4-FFF2-40B4-BE49-F238E27FC236}">
+                <a16:creationId xmlns:a16="http://schemas.microsoft.com/office/drawing/2014/main" id="{18C6CAC7-1AC4-461F-BCFB-213EF76A92EE}"/>
+              </a:ext>
+            </a:extLst>
+          </p:cNvPr>
+          <p:cNvSpPr>
+            <a:spLocks noGrp="1"/>
+          </p:cNvSpPr>
+          <p:nvPr>
+            <p:ph idx="1"/>
+          </p:nvPr>
+        </p:nvSpPr>
+        <p:spPr/>
+        <p:txBody>
+          <a:bodyPr/>
+          <a:lstStyle/>
+          <a:p>
+            <a:endParaRPr lang="en-US"/>
+          </a:p>
+        </p:txBody>
+      </p:sp>
+    </p:spTree>
+    <p:extLst>
+      <p:ext uri="{BB962C8B-B14F-4D97-AF65-F5344CB8AC3E}">
+        <p14:creationId xmlns:p14="http://schemas.microsoft.com/office/powerpoint/2010/main" val="2730496532"/>
+      </p:ext>
+    </p:extLst>
+  </p:cSld>
+  <p:clrMapOvr>
+    <a:masterClrMapping/>
+  </p:clrMapOvr>
+</p:sld>
+</file>
+
+<file path=ppt/slides/slide6.xml><?xml version="1.0" encoding="utf-8"?>
+<p:sld xmlns:a="http://schemas.openxmlformats.org/drawingml/2006/main" xmlns:r="http://schemas.openxmlformats.org/officeDocument/2006/relationships" xmlns:p="http://schemas.openxmlformats.org/presentationml/2006/main">
+  <p:cSld>
+    <p:spTree>
+      <p:nvGrpSpPr>
+        <p:cNvPr id="1" name=""/>
+        <p:cNvGrpSpPr/>
+        <p:nvPr/>
+      </p:nvGrpSpPr>
+      <p:grpSpPr>
+        <a:xfrm>
+          <a:off x="0" y="0"/>
+          <a:ext cx="0" cy="0"/>
+          <a:chOff x="0" y="0"/>
+          <a:chExt cx="0" cy="0"/>
+        </a:xfrm>
+      </p:grpSpPr>
+      <p:sp>
+        <p:nvSpPr>
+          <p:cNvPr id="2" name="Title 1">
+            <a:extLst>
+              <a:ext uri="{FF2B5EF4-FFF2-40B4-BE49-F238E27FC236}">
+                <a16:creationId xmlns:a16="http://schemas.microsoft.com/office/drawing/2014/main" id="{8DC2469B-491B-449B-BBAF-62C42A10CBD8}"/>
+              </a:ext>
+            </a:extLst>
+          </p:cNvPr>
+          <p:cNvSpPr>
+            <a:spLocks noGrp="1"/>
+          </p:cNvSpPr>
+          <p:nvPr>
+            <p:ph type="title"/>
+          </p:nvPr>
+        </p:nvSpPr>
+        <p:spPr/>
+        <p:txBody>
+          <a:bodyPr/>
+          <a:lstStyle/>
+          <a:p>
+            <a:endParaRPr lang="en-US"/>
+          </a:p>
+        </p:txBody>
+      </p:sp>
+      <p:sp>
+        <p:nvSpPr>
+          <p:cNvPr id="3" name="Content Placeholder 2">
+            <a:extLst>
+              <a:ext uri="{FF2B5EF4-FFF2-40B4-BE49-F238E27FC236}">
+                <a16:creationId xmlns:a16="http://schemas.microsoft.com/office/drawing/2014/main" id="{135F1482-E208-49C4-9C5B-CC00A1E8831F}"/>
+              </a:ext>
+            </a:extLst>
+          </p:cNvPr>
+          <p:cNvSpPr>
+            <a:spLocks noGrp="1"/>
+          </p:cNvSpPr>
+          <p:nvPr>
+            <p:ph idx="1"/>
+          </p:nvPr>
+        </p:nvSpPr>
+        <p:spPr/>
+        <p:txBody>
+          <a:bodyPr/>
+          <a:lstStyle/>
+          <a:p>
+            <a:endParaRPr lang="en-US"/>
+          </a:p>
+        </p:txBody>
+      </p:sp>
+    </p:spTree>
+    <p:extLst>
+      <p:ext uri="{BB962C8B-B14F-4D97-AF65-F5344CB8AC3E}">
+        <p14:creationId xmlns:p14="http://schemas.microsoft.com/office/powerpoint/2010/main" val="933643513"/>
+      </p:ext>
+    </p:extLst>
+  </p:cSld>
+  <p:clrMapOvr>
+    <a:masterClrMapping/>
+  </p:clrMapOvr>
+</p:sld>
+</file>
+
+<file path=ppt/slides/slide7.xml><?xml version="1.0" encoding="utf-8"?>
+<p:sld xmlns:a="http://schemas.openxmlformats.org/drawingml/2006/main" xmlns:r="http://schemas.openxmlformats.org/officeDocument/2006/relationships" xmlns:p="http://schemas.openxmlformats.org/presentationml/2006/main">
+  <p:cSld>
+    <p:spTree>
+      <p:nvGrpSpPr>
+        <p:cNvPr id="1" name=""/>
+        <p:cNvGrpSpPr/>
+        <p:nvPr/>
+      </p:nvGrpSpPr>
+      <p:grpSpPr>
+        <a:xfrm>
+          <a:off x="0" y="0"/>
+          <a:ext cx="0" cy="0"/>
+          <a:chOff x="0" y="0"/>
+          <a:chExt cx="0" cy="0"/>
+        </a:xfrm>
+      </p:grpSpPr>
+      <p:sp>
+        <p:nvSpPr>
+          <p:cNvPr id="2" name="Title 1">
+            <a:extLst>
+              <a:ext uri="{FF2B5EF4-FFF2-40B4-BE49-F238E27FC236}">
+                <a16:creationId xmlns:a16="http://schemas.microsoft.com/office/drawing/2014/main" id="{7A8E0AB1-DBE1-451C-A032-485F6286E3F3}"/>
+              </a:ext>
+            </a:extLst>
+          </p:cNvPr>
+          <p:cNvSpPr>
+            <a:spLocks noGrp="1"/>
+          </p:cNvSpPr>
+          <p:nvPr>
+            <p:ph type="title"/>
+          </p:nvPr>
+        </p:nvSpPr>
+        <p:spPr/>
+        <p:txBody>
+          <a:bodyPr/>
+          <a:lstStyle/>
+          <a:p>
+            <a:endParaRPr lang="en-US"/>
+          </a:p>
+        </p:txBody>
+      </p:sp>
+      <p:sp>
+        <p:nvSpPr>
+          <p:cNvPr id="3" name="Content Placeholder 2">
+            <a:extLst>
+              <a:ext uri="{FF2B5EF4-FFF2-40B4-BE49-F238E27FC236}">
+                <a16:creationId xmlns:a16="http://schemas.microsoft.com/office/drawing/2014/main" id="{A612F5A8-3E12-43BD-8784-444B5C059B56}"/>
+              </a:ext>
+            </a:extLst>
+          </p:cNvPr>
+          <p:cNvSpPr>
+            <a:spLocks noGrp="1"/>
+          </p:cNvSpPr>
+          <p:nvPr>
+            <p:ph idx="1"/>
+          </p:nvPr>
+        </p:nvSpPr>
+        <p:spPr/>
+        <p:txBody>
+          <a:bodyPr/>
+          <a:lstStyle/>
+          <a:p>
+            <a:endParaRPr lang="en-US"/>
+          </a:p>
+        </p:txBody>
+      </p:sp>
+    </p:spTree>
+    <p:extLst>
+      <p:ext uri="{BB962C8B-B14F-4D97-AF65-F5344CB8AC3E}">
+        <p14:creationId xmlns:p14="http://schemas.microsoft.com/office/powerpoint/2010/main" val="2869901700"/>
+      </p:ext>
+    </p:extLst>
+  </p:cSld>
+  <p:clrMapOvr>
+    <a:masterClrMapping/>
+  </p:clrMapOvr>
+</p:sld>
+</file>
+
+<file path=ppt/slides/slide8.xml><?xml version="1.0" encoding="utf-8"?>
+<p:sld xmlns:a="http://schemas.openxmlformats.org/drawingml/2006/main" xmlns:r="http://schemas.openxmlformats.org/officeDocument/2006/relationships" xmlns:p="http://schemas.openxmlformats.org/presentationml/2006/main">
+  <p:cSld>
+    <p:spTree>
+      <p:nvGrpSpPr>
+        <p:cNvPr id="1" name=""/>
+        <p:cNvGrpSpPr/>
+        <p:nvPr/>
+      </p:nvGrpSpPr>
+      <p:grpSpPr>
+        <a:xfrm>
+          <a:off x="0" y="0"/>
+          <a:ext cx="0" cy="0"/>
+          <a:chOff x="0" y="0"/>
+          <a:chExt cx="0" cy="0"/>
+        </a:xfrm>
+      </p:grpSpPr>
+      <p:sp>
+        <p:nvSpPr>
+          <p:cNvPr id="2" name="Title 1">
+            <a:extLst>
+              <a:ext uri="{FF2B5EF4-FFF2-40B4-BE49-F238E27FC236}">
+                <a16:creationId xmlns:a16="http://schemas.microsoft.com/office/drawing/2014/main" id="{DC884FA8-97A7-42A3-B4A8-6475A65F7904}"/>
+              </a:ext>
+            </a:extLst>
+          </p:cNvPr>
+          <p:cNvSpPr>
+            <a:spLocks noGrp="1"/>
+          </p:cNvSpPr>
+          <p:nvPr>
+            <p:ph type="title"/>
+          </p:nvPr>
+        </p:nvSpPr>
+        <p:spPr/>
+        <p:txBody>
+          <a:bodyPr/>
+          <a:lstStyle/>
+          <a:p>
+            <a:endParaRPr lang="en-US"/>
+          </a:p>
+        </p:txBody>
+      </p:sp>
+      <p:sp>
+        <p:nvSpPr>
+          <p:cNvPr id="3" name="Content Placeholder 2">
+            <a:extLst>
+              <a:ext uri="{FF2B5EF4-FFF2-40B4-BE49-F238E27FC236}">
+                <a16:creationId xmlns:a16="http://schemas.microsoft.com/office/drawing/2014/main" id="{AE0B144A-0F7A-49F4-A7FE-EFD985425F1F}"/>
+              </a:ext>
+            </a:extLst>
+          </p:cNvPr>
+          <p:cNvSpPr>
+            <a:spLocks noGrp="1"/>
+          </p:cNvSpPr>
+          <p:nvPr>
+            <p:ph idx="1"/>
+          </p:nvPr>
+        </p:nvSpPr>
+        <p:spPr/>
+        <p:txBody>
+          <a:bodyPr/>
+          <a:lstStyle/>
+          <a:p>
+            <a:endParaRPr lang="en-US"/>
+          </a:p>
+        </p:txBody>
+      </p:sp>
+    </p:spTree>
+    <p:extLst>
+      <p:ext uri="{BB962C8B-B14F-4D97-AF65-F5344CB8AC3E}">
+        <p14:creationId xmlns:p14="http://schemas.microsoft.com/office/powerpoint/2010/main" val="642101144"/>
+      </p:ext>
+    </p:extLst>
+  </p:cSld>
+  <p:clrMapOvr>
+    <a:masterClrMapping/>
+  </p:clrMapOvr>
+</p:sld>
+</file>
+
+<file path=ppt/slides/slide9.xml><?xml version="1.0" encoding="utf-8"?>
+<p:sld xmlns:a="http://schemas.openxmlformats.org/drawingml/2006/main" xmlns:r="http://schemas.openxmlformats.org/officeDocument/2006/relationships" xmlns:p="http://schemas.openxmlformats.org/presentationml/2006/main">
+  <p:cSld>
+    <p:spTree>
+      <p:nvGrpSpPr>
+        <p:cNvPr id="1" name=""/>
+        <p:cNvGrpSpPr/>
+        <p:nvPr/>
+      </p:nvGrpSpPr>
+      <p:grpSpPr>
+        <a:xfrm>
+          <a:off x="0" y="0"/>
+          <a:ext cx="0" cy="0"/>
+          <a:chOff x="0" y="0"/>
+          <a:chExt cx="0" cy="0"/>
+        </a:xfrm>
+      </p:grpSpPr>
+      <p:sp>
+        <p:nvSpPr>
+          <p:cNvPr id="2" name="Title 1">
+            <a:extLst>
+              <a:ext uri="{FF2B5EF4-FFF2-40B4-BE49-F238E27FC236}">
+                <a16:creationId xmlns:a16="http://schemas.microsoft.com/office/drawing/2014/main" id="{00A15753-9A0A-46A0-827A-191A50197E37}"/>
+              </a:ext>
+            </a:extLst>
+          </p:cNvPr>
+          <p:cNvSpPr>
+            <a:spLocks noGrp="1"/>
+          </p:cNvSpPr>
+          <p:nvPr>
+            <p:ph type="title"/>
+          </p:nvPr>
+        </p:nvSpPr>
+        <p:spPr/>
+        <p:txBody>
+          <a:bodyPr/>
+          <a:lstStyle/>
+          <a:p>
+            <a:endParaRPr lang="en-US"/>
+          </a:p>
+        </p:txBody>
+      </p:sp>
+      <p:sp>
+        <p:nvSpPr>
+          <p:cNvPr id="3" name="Content Placeholder 2">
+            <a:extLst>
+              <a:ext uri="{FF2B5EF4-FFF2-40B4-BE49-F238E27FC236}">
+                <a16:creationId xmlns:a16="http://schemas.microsoft.com/office/drawing/2014/main" id="{03CA9E21-7364-4DA9-8E97-33FFAA50BF9C}"/>
+              </a:ext>
+            </a:extLst>
+          </p:cNvPr>
+          <p:cNvSpPr>
+            <a:spLocks noGrp="1"/>
+          </p:cNvSpPr>
+          <p:nvPr>
+            <p:ph idx="1"/>
+          </p:nvPr>
+        </p:nvSpPr>
+        <p:spPr/>
+        <p:txBody>
+          <a:bodyPr/>
+          <a:lstStyle/>
+          <a:p>
+            <a:endParaRPr lang="en-US"/>
+          </a:p>
+        </p:txBody>
+      </p:sp>
+    </p:spTree>
+    <p:extLst>
+      <p:ext uri="{BB962C8B-B14F-4D97-AF65-F5344CB8AC3E}">
+        <p14:creationId xmlns:p14="http://schemas.microsoft.com/office/powerpoint/2010/main" val="1993694396"/>
       </p:ext>
     </p:extLst>
   </p:cSld>

</xml_diff>

<commit_message>
Data exploration slide outline
</commit_message>
<xml_diff>
--- a/Resources/Final.Presentation.pptx
+++ b/Resources/Final.Presentation.pptx
@@ -137,7 +137,7 @@
   <pc:docChgLst>
     <pc:chgData name="Taryn Syler" userId="d093462dc93fe5e1" providerId="LiveId" clId="{2D2F4B00-D67B-471E-8EC5-16430E5C6708}"/>
     <pc:docChg chg="undo custSel addSld modSld">
-      <pc:chgData name="Taryn Syler" userId="d093462dc93fe5e1" providerId="LiveId" clId="{2D2F4B00-D67B-471E-8EC5-16430E5C6708}" dt="2021-11-01T05:38:04.792" v="2313" actId="20577"/>
+      <pc:chgData name="Taryn Syler" userId="d093462dc93fe5e1" providerId="LiveId" clId="{2D2F4B00-D67B-471E-8EC5-16430E5C6708}" dt="2021-11-01T05:57:44.482" v="2661" actId="20577"/>
       <pc:docMkLst>
         <pc:docMk/>
       </pc:docMkLst>
@@ -330,12 +330,28 @@
           </ac:picMkLst>
         </pc:picChg>
       </pc:sldChg>
-      <pc:sldChg chg="new modNotesTx">
-        <pc:chgData name="Taryn Syler" userId="d093462dc93fe5e1" providerId="LiveId" clId="{2D2F4B00-D67B-471E-8EC5-16430E5C6708}" dt="2021-11-01T05:32:32.908" v="2024" actId="20577"/>
+      <pc:sldChg chg="modSp new mod modNotesTx">
+        <pc:chgData name="Taryn Syler" userId="d093462dc93fe5e1" providerId="LiveId" clId="{2D2F4B00-D67B-471E-8EC5-16430E5C6708}" dt="2021-11-01T05:57:44.482" v="2661" actId="20577"/>
         <pc:sldMkLst>
           <pc:docMk/>
           <pc:sldMk cId="2730496532" sldId="260"/>
         </pc:sldMkLst>
+        <pc:spChg chg="mod">
+          <ac:chgData name="Taryn Syler" userId="d093462dc93fe5e1" providerId="LiveId" clId="{2D2F4B00-D67B-471E-8EC5-16430E5C6708}" dt="2021-11-01T05:45:58.398" v="2330" actId="20577"/>
+          <ac:spMkLst>
+            <pc:docMk/>
+            <pc:sldMk cId="2730496532" sldId="260"/>
+            <ac:spMk id="2" creationId="{8B9EC104-FCF8-482D-833F-B9BAB79DA61D}"/>
+          </ac:spMkLst>
+        </pc:spChg>
+        <pc:spChg chg="mod">
+          <ac:chgData name="Taryn Syler" userId="d093462dc93fe5e1" providerId="LiveId" clId="{2D2F4B00-D67B-471E-8EC5-16430E5C6708}" dt="2021-11-01T05:57:44.482" v="2661" actId="20577"/>
+          <ac:spMkLst>
+            <pc:docMk/>
+            <pc:sldMk cId="2730496532" sldId="260"/>
+            <ac:spMk id="3" creationId="{18C6CAC7-1AC4-461F-BCFB-213EF76A92EE}"/>
+          </ac:spMkLst>
+        </pc:spChg>
       </pc:sldChg>
       <pc:sldChg chg="new modNotesTx">
         <pc:chgData name="Taryn Syler" userId="d093462dc93fe5e1" providerId="LiveId" clId="{2D2F4B00-D67B-471E-8EC5-16430E5C6708}" dt="2021-11-01T05:36:44.853" v="2086" actId="20577"/>
@@ -6502,7 +6518,10 @@
           <a:bodyPr/>
           <a:lstStyle/>
           <a:p>
-            <a:endParaRPr lang="en-US"/>
+            <a:r>
+              <a:rPr lang="en-US" dirty="0"/>
+              <a:t>Data exploration	</a:t>
+            </a:r>
           </a:p>
         </p:txBody>
       </p:sp>
@@ -6527,7 +6546,55 @@
           <a:bodyPr/>
           <a:lstStyle/>
           <a:p>
-            <a:endParaRPr lang="en-US"/>
+            <a:pPr marL="457200" indent="-457200">
+              <a:buFont typeface="Arial" panose="020B0604020202020204" pitchFamily="34" charset="0"/>
+              <a:buChar char="•"/>
+            </a:pPr>
+            <a:r>
+              <a:rPr lang="en-US" dirty="0"/>
+              <a:t>Screenshot or example of the data we found through external sources</a:t>
+            </a:r>
+          </a:p>
+          <a:p>
+            <a:pPr marL="457200" indent="-457200">
+              <a:buFont typeface="Arial" panose="020B0604020202020204" pitchFamily="34" charset="0"/>
+              <a:buChar char="•"/>
+            </a:pPr>
+            <a:r>
+              <a:rPr lang="en-US" dirty="0"/>
+              <a:t>Issues that came up</a:t>
+            </a:r>
+          </a:p>
+          <a:p>
+            <a:pPr marL="731520" lvl="1" indent="-457200">
+              <a:buFont typeface="Arial" panose="020B0604020202020204" pitchFamily="34" charset="0"/>
+              <a:buChar char="•"/>
+            </a:pPr>
+            <a:r>
+              <a:rPr lang="en-US" dirty="0"/>
+              <a:t>Potentially put this section later, when talking about doing things differently in the future</a:t>
+            </a:r>
+          </a:p>
+          <a:p>
+            <a:pPr marL="457200" indent="-457200">
+              <a:buFont typeface="Arial" panose="020B0604020202020204" pitchFamily="34" charset="0"/>
+              <a:buChar char="•"/>
+            </a:pPr>
+            <a:r>
+              <a:rPr lang="en-US" dirty="0"/>
+              <a:t>Finding which data to </a:t>
+            </a:r>
+            <a:r>
+              <a:rPr lang="en-US"/>
+              <a:t>focus on</a:t>
+            </a:r>
+            <a:endParaRPr lang="en-US" dirty="0"/>
+          </a:p>
+          <a:p>
+            <a:pPr lvl="1" indent="0">
+              <a:buNone/>
+            </a:pPr>
+            <a:endParaRPr lang="en-US" dirty="0"/>
           </a:p>
         </p:txBody>
       </p:sp>

</xml_diff>

<commit_message>
Analysis phase outline slide
</commit_message>
<xml_diff>
--- a/Resources/Final.Presentation.pptx
+++ b/Resources/Final.Presentation.pptx
@@ -137,7 +137,7 @@
   <pc:docChgLst>
     <pc:chgData name="Taryn Syler" userId="d093462dc93fe5e1" providerId="LiveId" clId="{2D2F4B00-D67B-471E-8EC5-16430E5C6708}"/>
     <pc:docChg chg="undo custSel addSld modSld">
-      <pc:chgData name="Taryn Syler" userId="d093462dc93fe5e1" providerId="LiveId" clId="{2D2F4B00-D67B-471E-8EC5-16430E5C6708}" dt="2021-11-01T05:57:44.482" v="2661" actId="20577"/>
+      <pc:chgData name="Taryn Syler" userId="d093462dc93fe5e1" providerId="LiveId" clId="{2D2F4B00-D67B-471E-8EC5-16430E5C6708}" dt="2021-11-01T06:03:01.430" v="2899" actId="20577"/>
       <pc:docMkLst>
         <pc:docMk/>
       </pc:docMkLst>
@@ -353,12 +353,28 @@
           </ac:spMkLst>
         </pc:spChg>
       </pc:sldChg>
-      <pc:sldChg chg="new modNotesTx">
-        <pc:chgData name="Taryn Syler" userId="d093462dc93fe5e1" providerId="LiveId" clId="{2D2F4B00-D67B-471E-8EC5-16430E5C6708}" dt="2021-11-01T05:36:44.853" v="2086" actId="20577"/>
+      <pc:sldChg chg="modSp new mod modNotesTx">
+        <pc:chgData name="Taryn Syler" userId="d093462dc93fe5e1" providerId="LiveId" clId="{2D2F4B00-D67B-471E-8EC5-16430E5C6708}" dt="2021-11-01T06:03:01.430" v="2899" actId="20577"/>
         <pc:sldMkLst>
           <pc:docMk/>
           <pc:sldMk cId="933643513" sldId="261"/>
         </pc:sldMkLst>
+        <pc:spChg chg="mod">
+          <ac:chgData name="Taryn Syler" userId="d093462dc93fe5e1" providerId="LiveId" clId="{2D2F4B00-D67B-471E-8EC5-16430E5C6708}" dt="2021-11-01T06:00:42.604" v="2675" actId="20577"/>
+          <ac:spMkLst>
+            <pc:docMk/>
+            <pc:sldMk cId="933643513" sldId="261"/>
+            <ac:spMk id="2" creationId="{8DC2469B-491B-449B-BBAF-62C42A10CBD8}"/>
+          </ac:spMkLst>
+        </pc:spChg>
+        <pc:spChg chg="mod">
+          <ac:chgData name="Taryn Syler" userId="d093462dc93fe5e1" providerId="LiveId" clId="{2D2F4B00-D67B-471E-8EC5-16430E5C6708}" dt="2021-11-01T06:03:01.430" v="2899" actId="20577"/>
+          <ac:spMkLst>
+            <pc:docMk/>
+            <pc:sldMk cId="933643513" sldId="261"/>
+            <ac:spMk id="3" creationId="{135F1482-E208-49C4-9C5B-CC00A1E8831F}"/>
+          </ac:spMkLst>
+        </pc:spChg>
       </pc:sldChg>
       <pc:sldChg chg="new modNotesTx">
         <pc:chgData name="Taryn Syler" userId="d093462dc93fe5e1" providerId="LiveId" clId="{2D2F4B00-D67B-471E-8EC5-16430E5C6708}" dt="2021-11-01T05:37:18.958" v="2181" actId="20577"/>
@@ -6649,7 +6665,10 @@
           <a:bodyPr/>
           <a:lstStyle/>
           <a:p>
-            <a:endParaRPr lang="en-US"/>
+            <a:r>
+              <a:rPr lang="en-US" dirty="0"/>
+              <a:t>Analysis phase</a:t>
+            </a:r>
           </a:p>
         </p:txBody>
       </p:sp>
@@ -6674,7 +6693,58 @@
           <a:bodyPr/>
           <a:lstStyle/>
           <a:p>
-            <a:endParaRPr lang="en-US"/>
+            <a:pPr marL="457200" indent="-457200">
+              <a:buFont typeface="Arial" panose="020B0604020202020204" pitchFamily="34" charset="0"/>
+              <a:buChar char="•"/>
+            </a:pPr>
+            <a:r>
+              <a:rPr lang="en-US" dirty="0"/>
+              <a:t>Figuring out which data to analyze</a:t>
+            </a:r>
+          </a:p>
+          <a:p>
+            <a:pPr marL="457200" indent="-457200">
+              <a:buFont typeface="Arial" panose="020B0604020202020204" pitchFamily="34" charset="0"/>
+              <a:buChar char="•"/>
+            </a:pPr>
+            <a:r>
+              <a:rPr lang="en-US" dirty="0"/>
+              <a:t>What methods we used to analyze the data</a:t>
+            </a:r>
+          </a:p>
+          <a:p>
+            <a:pPr marL="457200" indent="-457200">
+              <a:buFont typeface="Arial" panose="020B0604020202020204" pitchFamily="34" charset="0"/>
+              <a:buChar char="•"/>
+            </a:pPr>
+            <a:r>
+              <a:rPr lang="en-US" dirty="0"/>
+              <a:t>How will our machine analyze data</a:t>
+            </a:r>
+          </a:p>
+          <a:p>
+            <a:pPr marL="457200" indent="-457200">
+              <a:buFont typeface="Arial" panose="020B0604020202020204" pitchFamily="34" charset="0"/>
+              <a:buChar char="•"/>
+            </a:pPr>
+            <a:r>
+              <a:rPr lang="en-US" dirty="0"/>
+              <a:t>What is the purpose of analyzing the data</a:t>
+            </a:r>
+          </a:p>
+          <a:p>
+            <a:pPr marL="457200" indent="-457200">
+              <a:buFont typeface="Arial" panose="020B0604020202020204" pitchFamily="34" charset="0"/>
+              <a:buChar char="•"/>
+            </a:pPr>
+            <a:r>
+              <a:rPr lang="en-US" dirty="0"/>
+              <a:t>Analyzing results of </a:t>
+            </a:r>
+            <a:r>
+              <a:rPr lang="en-US"/>
+              <a:t>the machine</a:t>
+            </a:r>
           </a:p>
         </p:txBody>
       </p:sp>

</xml_diff>

<commit_message>
Data exploration visual added
</commit_message>
<xml_diff>
--- a/Resources/Final.Presentation.pptx
+++ b/Resources/Final.Presentation.pptx
@@ -5,7 +5,7 @@
     <p:sldMasterId id="2147483673" r:id="rId1"/>
   </p:sldMasterIdLst>
   <p:notesMasterIdLst>
-    <p:notesMasterId r:id="rId12"/>
+    <p:notesMasterId r:id="rId13"/>
   </p:notesMasterIdLst>
   <p:sldIdLst>
     <p:sldId id="256" r:id="rId2"/>
@@ -13,11 +13,12 @@
     <p:sldId id="258" r:id="rId4"/>
     <p:sldId id="259" r:id="rId5"/>
     <p:sldId id="260" r:id="rId6"/>
-    <p:sldId id="261" r:id="rId7"/>
-    <p:sldId id="262" r:id="rId8"/>
-    <p:sldId id="263" r:id="rId9"/>
-    <p:sldId id="264" r:id="rId10"/>
-    <p:sldId id="265" r:id="rId11"/>
+    <p:sldId id="266" r:id="rId7"/>
+    <p:sldId id="261" r:id="rId8"/>
+    <p:sldId id="262" r:id="rId9"/>
+    <p:sldId id="263" r:id="rId10"/>
+    <p:sldId id="264" r:id="rId11"/>
+    <p:sldId id="265" r:id="rId12"/>
   </p:sldIdLst>
   <p:sldSz cx="12192000" cy="6858000"/>
   <p:notesSz cx="6858000" cy="9144000"/>
@@ -127,7 +128,7 @@
 <file path=ppt/revisionInfo.xml><?xml version="1.0" encoding="utf-8"?>
 <p1510:revInfo xmlns:a="http://schemas.openxmlformats.org/drawingml/2006/main" xmlns:r="http://schemas.openxmlformats.org/officeDocument/2006/relationships" xmlns:p1510="http://schemas.microsoft.com/office/powerpoint/2015/10/main">
   <p1510:revLst>
-    <p1510:client id="{2D2F4B00-D67B-471E-8EC5-16430E5C6708}" v="9" dt="2021-10-25T04:22:01.354"/>
+    <p1510:client id="{2D2F4B00-D67B-471E-8EC5-16430E5C6708}" v="13" dt="2021-11-08T04:13:36.447"/>
   </p1510:revLst>
 </p1510:revInfo>
 </file>
@@ -137,7 +138,7 @@
   <pc:docChgLst>
     <pc:chgData name="Taryn Syler" userId="d093462dc93fe5e1" providerId="LiveId" clId="{2D2F4B00-D67B-471E-8EC5-16430E5C6708}"/>
     <pc:docChg chg="undo custSel addSld modSld">
-      <pc:chgData name="Taryn Syler" userId="d093462dc93fe5e1" providerId="LiveId" clId="{2D2F4B00-D67B-471E-8EC5-16430E5C6708}" dt="2021-11-01T06:15:15.074" v="3103" actId="20577"/>
+      <pc:chgData name="Taryn Syler" userId="d093462dc93fe5e1" providerId="LiveId" clId="{2D2F4B00-D67B-471E-8EC5-16430E5C6708}" dt="2021-11-08T04:13:44.173" v="3166" actId="20577"/>
       <pc:docMkLst>
         <pc:docMk/>
       </pc:docMkLst>
@@ -330,8 +331,8 @@
           </ac:picMkLst>
         </pc:picChg>
       </pc:sldChg>
-      <pc:sldChg chg="modSp new mod modNotesTx">
-        <pc:chgData name="Taryn Syler" userId="d093462dc93fe5e1" providerId="LiveId" clId="{2D2F4B00-D67B-471E-8EC5-16430E5C6708}" dt="2021-11-01T05:57:44.482" v="2661" actId="20577"/>
+      <pc:sldChg chg="addSp delSp modSp new mod modNotesTx">
+        <pc:chgData name="Taryn Syler" userId="d093462dc93fe5e1" providerId="LiveId" clId="{2D2F4B00-D67B-471E-8EC5-16430E5C6708}" dt="2021-11-08T04:12:45.613" v="3110" actId="21"/>
         <pc:sldMkLst>
           <pc:docMk/>
           <pc:sldMk cId="2730496532" sldId="260"/>
@@ -345,13 +346,21 @@
           </ac:spMkLst>
         </pc:spChg>
         <pc:spChg chg="mod">
-          <ac:chgData name="Taryn Syler" userId="d093462dc93fe5e1" providerId="LiveId" clId="{2D2F4B00-D67B-471E-8EC5-16430E5C6708}" dt="2021-11-01T05:57:44.482" v="2661" actId="20577"/>
+          <ac:chgData name="Taryn Syler" userId="d093462dc93fe5e1" providerId="LiveId" clId="{2D2F4B00-D67B-471E-8EC5-16430E5C6708}" dt="2021-11-08T04:12:42.936" v="3108"/>
           <ac:spMkLst>
             <pc:docMk/>
             <pc:sldMk cId="2730496532" sldId="260"/>
             <ac:spMk id="3" creationId="{18C6CAC7-1AC4-461F-BCFB-213EF76A92EE}"/>
           </ac:spMkLst>
         </pc:spChg>
+        <pc:picChg chg="add del mod">
+          <ac:chgData name="Taryn Syler" userId="d093462dc93fe5e1" providerId="LiveId" clId="{2D2F4B00-D67B-471E-8EC5-16430E5C6708}" dt="2021-11-08T04:12:45.613" v="3110" actId="21"/>
+          <ac:picMkLst>
+            <pc:docMk/>
+            <pc:sldMk cId="2730496532" sldId="260"/>
+            <ac:picMk id="4" creationId="{90779B96-A73C-4E57-B435-A767CBAA17CB}"/>
+          </ac:picMkLst>
+        </pc:picChg>
       </pc:sldChg>
       <pc:sldChg chg="modSp new mod modNotesTx">
         <pc:chgData name="Taryn Syler" userId="d093462dc93fe5e1" providerId="LiveId" clId="{2D2F4B00-D67B-471E-8EC5-16430E5C6708}" dt="2021-11-01T06:03:01.430" v="2899" actId="20577"/>
@@ -420,6 +429,69 @@
           <pc:sldMk cId="1302545605" sldId="265"/>
         </pc:sldMkLst>
       </pc:sldChg>
+      <pc:sldChg chg="addSp delSp modSp new mod setBg modNotesTx">
+        <pc:chgData name="Taryn Syler" userId="d093462dc93fe5e1" providerId="LiveId" clId="{2D2F4B00-D67B-471E-8EC5-16430E5C6708}" dt="2021-11-08T04:13:44.173" v="3166" actId="20577"/>
+        <pc:sldMkLst>
+          <pc:docMk/>
+          <pc:sldMk cId="3767825425" sldId="266"/>
+        </pc:sldMkLst>
+        <pc:spChg chg="del">
+          <ac:chgData name="Taryn Syler" userId="d093462dc93fe5e1" providerId="LiveId" clId="{2D2F4B00-D67B-471E-8EC5-16430E5C6708}" dt="2021-11-08T04:12:53.065" v="3113" actId="26606"/>
+          <ac:spMkLst>
+            <pc:docMk/>
+            <pc:sldMk cId="3767825425" sldId="266"/>
+            <ac:spMk id="2" creationId="{F4C2C54E-88B6-41D6-9D5A-BE3D675F3091}"/>
+          </ac:spMkLst>
+        </pc:spChg>
+        <pc:spChg chg="del">
+          <ac:chgData name="Taryn Syler" userId="d093462dc93fe5e1" providerId="LiveId" clId="{2D2F4B00-D67B-471E-8EC5-16430E5C6708}" dt="2021-11-08T04:12:49.939" v="3112"/>
+          <ac:spMkLst>
+            <pc:docMk/>
+            <pc:sldMk cId="3767825425" sldId="266"/>
+            <ac:spMk id="3" creationId="{205A65A4-12DC-458A-9360-57F0A839FF77}"/>
+          </ac:spMkLst>
+        </pc:spChg>
+        <pc:spChg chg="add del">
+          <ac:chgData name="Taryn Syler" userId="d093462dc93fe5e1" providerId="LiveId" clId="{2D2F4B00-D67B-471E-8EC5-16430E5C6708}" dt="2021-11-08T04:13:12.978" v="3120" actId="26606"/>
+          <ac:spMkLst>
+            <pc:docMk/>
+            <pc:sldMk cId="3767825425" sldId="266"/>
+            <ac:spMk id="9" creationId="{6BC377B7-18F1-42AD-A1DD-E1D6A5B27CE9}"/>
+          </ac:spMkLst>
+        </pc:spChg>
+        <pc:spChg chg="add del">
+          <ac:chgData name="Taryn Syler" userId="d093462dc93fe5e1" providerId="LiveId" clId="{2D2F4B00-D67B-471E-8EC5-16430E5C6708}" dt="2021-11-08T04:13:12.978" v="3120" actId="26606"/>
+          <ac:spMkLst>
+            <pc:docMk/>
+            <pc:sldMk cId="3767825425" sldId="266"/>
+            <ac:spMk id="11" creationId="{E27CBDD7-6A01-4B3F-B16A-F50305427BC5}"/>
+          </ac:spMkLst>
+        </pc:spChg>
+        <pc:spChg chg="add">
+          <ac:chgData name="Taryn Syler" userId="d093462dc93fe5e1" providerId="LiveId" clId="{2D2F4B00-D67B-471E-8EC5-16430E5C6708}" dt="2021-11-08T04:13:12.978" v="3120" actId="26606"/>
+          <ac:spMkLst>
+            <pc:docMk/>
+            <pc:sldMk cId="3767825425" sldId="266"/>
+            <ac:spMk id="16" creationId="{6BC377B7-18F1-42AD-A1DD-E1D6A5B27CE9}"/>
+          </ac:spMkLst>
+        </pc:spChg>
+        <pc:picChg chg="add mod">
+          <ac:chgData name="Taryn Syler" userId="d093462dc93fe5e1" providerId="LiveId" clId="{2D2F4B00-D67B-471E-8EC5-16430E5C6708}" dt="2021-11-08T04:13:21.085" v="3123" actId="1076"/>
+          <ac:picMkLst>
+            <pc:docMk/>
+            <pc:sldMk cId="3767825425" sldId="266"/>
+            <ac:picMk id="4" creationId="{55B0D92C-A760-45A4-BE44-F23FDB40180B}"/>
+          </ac:picMkLst>
+        </pc:picChg>
+        <pc:picChg chg="add del mod">
+          <ac:chgData name="Taryn Syler" userId="d093462dc93fe5e1" providerId="LiveId" clId="{2D2F4B00-D67B-471E-8EC5-16430E5C6708}" dt="2021-11-08T04:13:36.447" v="3125"/>
+          <ac:picMkLst>
+            <pc:docMk/>
+            <pc:sldMk cId="3767825425" sldId="266"/>
+            <ac:picMk id="8" creationId="{CC1E67CF-80B8-4F4E-BE9A-0B886824B383}"/>
+          </ac:picMkLst>
+        </pc:picChg>
+      </pc:sldChg>
     </pc:docChg>
   </pc:docChgLst>
 </pc:chgInfo>
@@ -507,7 +579,7 @@
           <a:p>
             <a:fld id="{917E58E4-3C21-4D5C-B4E1-FAE723A9F180}" type="datetimeFigureOut">
               <a:rPr lang="en-US" smtClean="0"/>
-              <a:t>10/31/2021</a:t>
+              <a:t>11/2/2021</a:t>
             </a:fld>
             <a:endParaRPr lang="en-US"/>
           </a:p>
@@ -874,6 +946,93 @@
 </p:notes>
 </file>
 
+<file path=ppt/notesSlides/notesSlide10.xml><?xml version="1.0" encoding="utf-8"?>
+<p:notes xmlns:a="http://schemas.openxmlformats.org/drawingml/2006/main" xmlns:r="http://schemas.openxmlformats.org/officeDocument/2006/relationships" xmlns:p="http://schemas.openxmlformats.org/presentationml/2006/main">
+  <p:cSld>
+    <p:spTree>
+      <p:nvGrpSpPr>
+        <p:cNvPr id="1" name=""/>
+        <p:cNvGrpSpPr/>
+        <p:nvPr/>
+      </p:nvGrpSpPr>
+      <p:grpSpPr>
+        <a:xfrm>
+          <a:off x="0" y="0"/>
+          <a:ext cx="0" cy="0"/>
+          <a:chOff x="0" y="0"/>
+          <a:chExt cx="0" cy="0"/>
+        </a:xfrm>
+      </p:grpSpPr>
+      <p:sp>
+        <p:nvSpPr>
+          <p:cNvPr id="2" name="Slide Image Placeholder 1"/>
+          <p:cNvSpPr>
+            <a:spLocks noGrp="1" noRot="1" noChangeAspect="1"/>
+          </p:cNvSpPr>
+          <p:nvPr>
+            <p:ph type="sldImg"/>
+          </p:nvPr>
+        </p:nvSpPr>
+        <p:spPr/>
+      </p:sp>
+      <p:sp>
+        <p:nvSpPr>
+          <p:cNvPr id="3" name="Notes Placeholder 2"/>
+          <p:cNvSpPr>
+            <a:spLocks noGrp="1"/>
+          </p:cNvSpPr>
+          <p:nvPr>
+            <p:ph type="body" idx="1"/>
+          </p:nvPr>
+        </p:nvSpPr>
+        <p:spPr/>
+        <p:txBody>
+          <a:bodyPr/>
+          <a:lstStyle/>
+          <a:p>
+            <a:r>
+              <a:rPr lang="en-US" dirty="0"/>
+              <a:t>Anything the team would have done differently:</a:t>
+            </a:r>
+          </a:p>
+        </p:txBody>
+      </p:sp>
+      <p:sp>
+        <p:nvSpPr>
+          <p:cNvPr id="4" name="Slide Number Placeholder 3"/>
+          <p:cNvSpPr>
+            <a:spLocks noGrp="1"/>
+          </p:cNvSpPr>
+          <p:nvPr>
+            <p:ph type="sldNum" sz="quarter" idx="5"/>
+          </p:nvPr>
+        </p:nvSpPr>
+        <p:spPr/>
+        <p:txBody>
+          <a:bodyPr/>
+          <a:lstStyle/>
+          <a:p>
+            <a:fld id="{8382AD83-B5DF-4BD6-AC2B-95FF0DEC3221}" type="slidenum">
+              <a:rPr lang="en-US" smtClean="0"/>
+              <a:t>11</a:t>
+            </a:fld>
+            <a:endParaRPr lang="en-US"/>
+          </a:p>
+        </p:txBody>
+      </p:sp>
+    </p:spTree>
+    <p:extLst>
+      <p:ext uri="{BB962C8B-B14F-4D97-AF65-F5344CB8AC3E}">
+        <p14:creationId xmlns:p14="http://schemas.microsoft.com/office/powerpoint/2010/main" val="1968929199"/>
+      </p:ext>
+    </p:extLst>
+  </p:cSld>
+  <p:clrMapOvr>
+    <a:masterClrMapping/>
+  </p:clrMapOvr>
+</p:notes>
+</file>
+
 <file path=ppt/notesSlides/notesSlide2.xml><?xml version="1.0" encoding="utf-8"?>
 <p:notes xmlns:a="http://schemas.openxmlformats.org/drawingml/2006/main" xmlns:r="http://schemas.openxmlformats.org/officeDocument/2006/relationships" xmlns:p="http://schemas.openxmlformats.org/presentationml/2006/main">
   <p:cSld>
@@ -1203,9 +1362,10 @@
           <a:lstStyle/>
           <a:p>
             <a:r>
-              <a:rPr lang="en-US" dirty="0"/>
-              <a:t>Description of the analysis phase of the project:</a:t>
-            </a:r>
+              <a:rPr lang="en-US"/>
+              <a:t>Data exploration visual</a:t>
+            </a:r>
+            <a:endParaRPr lang="en-US" dirty="0"/>
           </a:p>
         </p:txBody>
       </p:sp>
@@ -1235,7 +1395,7 @@
     </p:spTree>
     <p:extLst>
       <p:ext uri="{BB962C8B-B14F-4D97-AF65-F5344CB8AC3E}">
-        <p14:creationId xmlns:p14="http://schemas.microsoft.com/office/powerpoint/2010/main" val="207807768"/>
+        <p14:creationId xmlns:p14="http://schemas.microsoft.com/office/powerpoint/2010/main" val="185165845"/>
       </p:ext>
     </p:extLst>
   </p:cSld>
@@ -1291,7 +1451,7 @@
           <a:p>
             <a:r>
               <a:rPr lang="en-US" dirty="0"/>
-              <a:t>Technologies, languages, tools, and algorithms used throughout the project: </a:t>
+              <a:t>Description of the analysis phase of the project:</a:t>
             </a:r>
           </a:p>
         </p:txBody>
@@ -1322,7 +1482,7 @@
     </p:spTree>
     <p:extLst>
       <p:ext uri="{BB962C8B-B14F-4D97-AF65-F5344CB8AC3E}">
-        <p14:creationId xmlns:p14="http://schemas.microsoft.com/office/powerpoint/2010/main" val="4045243988"/>
+        <p14:creationId xmlns:p14="http://schemas.microsoft.com/office/powerpoint/2010/main" val="207807768"/>
       </p:ext>
     </p:extLst>
   </p:cSld>
@@ -1378,7 +1538,7 @@
           <a:p>
             <a:r>
               <a:rPr lang="en-US" dirty="0"/>
-              <a:t>Result of analysis:</a:t>
+              <a:t>Technologies, languages, tools, and algorithms used throughout the project: </a:t>
             </a:r>
           </a:p>
         </p:txBody>
@@ -1409,7 +1569,7 @@
     </p:spTree>
     <p:extLst>
       <p:ext uri="{BB962C8B-B14F-4D97-AF65-F5344CB8AC3E}">
-        <p14:creationId xmlns:p14="http://schemas.microsoft.com/office/powerpoint/2010/main" val="2296447071"/>
+        <p14:creationId xmlns:p14="http://schemas.microsoft.com/office/powerpoint/2010/main" val="4045243988"/>
       </p:ext>
     </p:extLst>
   </p:cSld>
@@ -1465,7 +1625,7 @@
           <a:p>
             <a:r>
               <a:rPr lang="en-US" dirty="0"/>
-              <a:t>Recommendation for future analysis: </a:t>
+              <a:t>Result of analysis:</a:t>
             </a:r>
           </a:p>
         </p:txBody>
@@ -1496,7 +1656,7 @@
     </p:spTree>
     <p:extLst>
       <p:ext uri="{BB962C8B-B14F-4D97-AF65-F5344CB8AC3E}">
-        <p14:creationId xmlns:p14="http://schemas.microsoft.com/office/powerpoint/2010/main" val="1659576050"/>
+        <p14:creationId xmlns:p14="http://schemas.microsoft.com/office/powerpoint/2010/main" val="2296447071"/>
       </p:ext>
     </p:extLst>
   </p:cSld>
@@ -1552,11 +1712,7 @@
           <a:p>
             <a:r>
               <a:rPr lang="en-US" dirty="0"/>
-              <a:t>Anything the team would have </a:t>
-            </a:r>
-            <a:r>
-              <a:rPr lang="en-US"/>
-              <a:t>done differently:</a:t>
+              <a:t>Recommendation for future analysis: </a:t>
             </a:r>
           </a:p>
         </p:txBody>
@@ -1587,7 +1743,7 @@
     </p:spTree>
     <p:extLst>
       <p:ext uri="{BB962C8B-B14F-4D97-AF65-F5344CB8AC3E}">
-        <p14:creationId xmlns:p14="http://schemas.microsoft.com/office/powerpoint/2010/main" val="1968929199"/>
+        <p14:creationId xmlns:p14="http://schemas.microsoft.com/office/powerpoint/2010/main" val="1659576050"/>
       </p:ext>
     </p:extLst>
   </p:cSld>
@@ -1819,7 +1975,7 @@
             <a:fld id="{A37D6D71-8B28-4ED6-B932-04B197003D23}" type="datetimeFigureOut">
               <a:rPr lang="en-US" smtClean="0"/>
               <a:pPr algn="r"/>
-              <a:t>10/31/2021</a:t>
+              <a:t>11/2/2021</a:t>
             </a:fld>
             <a:endParaRPr lang="en-US" dirty="0"/>
           </a:p>
@@ -2041,7 +2197,7 @@
             <a:fld id="{A37D6D71-8B28-4ED6-B932-04B197003D23}" type="datetimeFigureOut">
               <a:rPr lang="en-US" smtClean="0"/>
               <a:pPr algn="r"/>
-              <a:t>10/31/2021</a:t>
+              <a:t>11/2/2021</a:t>
             </a:fld>
             <a:endParaRPr lang="en-US" dirty="0"/>
           </a:p>
@@ -2324,7 +2480,7 @@
             <a:fld id="{A37D6D71-8B28-4ED6-B932-04B197003D23}" type="datetimeFigureOut">
               <a:rPr lang="en-US" smtClean="0"/>
               <a:pPr algn="r"/>
-              <a:t>10/31/2021</a:t>
+              <a:t>11/2/2021</a:t>
             </a:fld>
             <a:endParaRPr lang="en-US" dirty="0"/>
           </a:p>
@@ -2538,7 +2694,7 @@
             <a:fld id="{A37D6D71-8B28-4ED6-B932-04B197003D23}" type="datetimeFigureOut">
               <a:rPr lang="en-US" smtClean="0"/>
               <a:pPr algn="r"/>
-              <a:t>10/31/2021</a:t>
+              <a:t>11/2/2021</a:t>
             </a:fld>
             <a:endParaRPr lang="en-US" dirty="0"/>
           </a:p>
@@ -2876,7 +3032,7 @@
             <a:fld id="{A37D6D71-8B28-4ED6-B932-04B197003D23}" type="datetimeFigureOut">
               <a:rPr lang="en-US" smtClean="0"/>
               <a:pPr algn="r"/>
-              <a:t>10/31/2021</a:t>
+              <a:t>11/2/2021</a:t>
             </a:fld>
             <a:endParaRPr lang="en-US" dirty="0"/>
           </a:p>
@@ -3151,7 +3307,7 @@
             <a:fld id="{A37D6D71-8B28-4ED6-B932-04B197003D23}" type="datetimeFigureOut">
               <a:rPr lang="en-US" smtClean="0"/>
               <a:pPr algn="r"/>
-              <a:t>10/31/2021</a:t>
+              <a:t>11/2/2021</a:t>
             </a:fld>
             <a:endParaRPr lang="en-US" dirty="0"/>
           </a:p>
@@ -3540,7 +3696,7 @@
             <a:fld id="{A37D6D71-8B28-4ED6-B932-04B197003D23}" type="datetimeFigureOut">
               <a:rPr lang="en-US" smtClean="0"/>
               <a:pPr algn="r"/>
-              <a:t>10/31/2021</a:t>
+              <a:t>11/2/2021</a:t>
             </a:fld>
             <a:endParaRPr lang="en-US" dirty="0"/>
           </a:p>
@@ -3717,7 +3873,7 @@
             <a:fld id="{A37D6D71-8B28-4ED6-B932-04B197003D23}" type="datetimeFigureOut">
               <a:rPr lang="en-US" smtClean="0"/>
               <a:pPr algn="r"/>
-              <a:t>10/31/2021</a:t>
+              <a:t>11/2/2021</a:t>
             </a:fld>
             <a:endParaRPr lang="en-US" dirty="0"/>
           </a:p>
@@ -3838,7 +3994,7 @@
             <a:fld id="{A37D6D71-8B28-4ED6-B932-04B197003D23}" type="datetimeFigureOut">
               <a:rPr lang="en-US" smtClean="0"/>
               <a:pPr algn="r"/>
-              <a:t>10/31/2021</a:t>
+              <a:t>11/2/2021</a:t>
             </a:fld>
             <a:endParaRPr lang="en-US" dirty="0"/>
           </a:p>
@@ -4123,7 +4279,7 @@
             <a:fld id="{A37D6D71-8B28-4ED6-B932-04B197003D23}" type="datetimeFigureOut">
               <a:rPr lang="en-US" smtClean="0"/>
               <a:pPr algn="r"/>
-              <a:t>10/31/2021</a:t>
+              <a:t>11/2/2021</a:t>
             </a:fld>
             <a:endParaRPr lang="en-US" dirty="0"/>
           </a:p>
@@ -4424,7 +4580,7 @@
             <a:fld id="{A37D6D71-8B28-4ED6-B932-04B197003D23}" type="datetimeFigureOut">
               <a:rPr lang="en-US" smtClean="0"/>
               <a:pPr algn="r"/>
-              <a:t>10/31/2021</a:t>
+              <a:t>11/2/2021</a:t>
             </a:fld>
             <a:endParaRPr lang="en-US" dirty="0"/>
           </a:p>
@@ -4772,7 +4928,7 @@
             <a:fld id="{A37D6D71-8B28-4ED6-B932-04B197003D23}" type="datetimeFigureOut">
               <a:rPr lang="en-US" smtClean="0"/>
               <a:pPr algn="r"/>
-              <a:t>10/31/2021</a:t>
+              <a:t>11/2/2021</a:t>
             </a:fld>
             <a:endParaRPr lang="en-US" spc="50" dirty="0"/>
           </a:p>
@@ -5693,6 +5849,86 @@
           <p:cNvPr id="2" name="Title 1">
             <a:extLst>
               <a:ext uri="{FF2B5EF4-FFF2-40B4-BE49-F238E27FC236}">
+                <a16:creationId xmlns:a16="http://schemas.microsoft.com/office/drawing/2014/main" id="{00A15753-9A0A-46A0-827A-191A50197E37}"/>
+              </a:ext>
+            </a:extLst>
+          </p:cNvPr>
+          <p:cNvSpPr>
+            <a:spLocks noGrp="1"/>
+          </p:cNvSpPr>
+          <p:nvPr>
+            <p:ph type="title"/>
+          </p:nvPr>
+        </p:nvSpPr>
+        <p:spPr/>
+        <p:txBody>
+          <a:bodyPr/>
+          <a:lstStyle/>
+          <a:p>
+            <a:endParaRPr lang="en-US"/>
+          </a:p>
+        </p:txBody>
+      </p:sp>
+      <p:sp>
+        <p:nvSpPr>
+          <p:cNvPr id="3" name="Content Placeholder 2">
+            <a:extLst>
+              <a:ext uri="{FF2B5EF4-FFF2-40B4-BE49-F238E27FC236}">
+                <a16:creationId xmlns:a16="http://schemas.microsoft.com/office/drawing/2014/main" id="{03CA9E21-7364-4DA9-8E97-33FFAA50BF9C}"/>
+              </a:ext>
+            </a:extLst>
+          </p:cNvPr>
+          <p:cNvSpPr>
+            <a:spLocks noGrp="1"/>
+          </p:cNvSpPr>
+          <p:nvPr>
+            <p:ph idx="1"/>
+          </p:nvPr>
+        </p:nvSpPr>
+        <p:spPr/>
+        <p:txBody>
+          <a:bodyPr/>
+          <a:lstStyle/>
+          <a:p>
+            <a:endParaRPr lang="en-US"/>
+          </a:p>
+        </p:txBody>
+      </p:sp>
+    </p:spTree>
+    <p:extLst>
+      <p:ext uri="{BB962C8B-B14F-4D97-AF65-F5344CB8AC3E}">
+        <p14:creationId xmlns:p14="http://schemas.microsoft.com/office/powerpoint/2010/main" val="1993694396"/>
+      </p:ext>
+    </p:extLst>
+  </p:cSld>
+  <p:clrMapOvr>
+    <a:masterClrMapping/>
+  </p:clrMapOvr>
+</p:sld>
+</file>
+
+<file path=ppt/slides/slide11.xml><?xml version="1.0" encoding="utf-8"?>
+<p:sld xmlns:a="http://schemas.openxmlformats.org/drawingml/2006/main" xmlns:r="http://schemas.openxmlformats.org/officeDocument/2006/relationships" xmlns:p="http://schemas.openxmlformats.org/presentationml/2006/main">
+  <p:cSld>
+    <p:spTree>
+      <p:nvGrpSpPr>
+        <p:cNvPr id="1" name=""/>
+        <p:cNvGrpSpPr/>
+        <p:nvPr/>
+      </p:nvGrpSpPr>
+      <p:grpSpPr>
+        <a:xfrm>
+          <a:off x="0" y="0"/>
+          <a:ext cx="0" cy="0"/>
+          <a:chOff x="0" y="0"/>
+          <a:chExt cx="0" cy="0"/>
+        </a:xfrm>
+      </p:grpSpPr>
+      <p:sp>
+        <p:nvSpPr>
+          <p:cNvPr id="2" name="Title 1">
+            <a:extLst>
+              <a:ext uri="{FF2B5EF4-FFF2-40B4-BE49-F238E27FC236}">
                 <a16:creationId xmlns:a16="http://schemas.microsoft.com/office/drawing/2014/main" id="{F7EE706F-D698-4024-BCE4-B57C05976FEF}"/>
               </a:ext>
             </a:extLst>
@@ -6614,13 +6850,8 @@
             </a:pPr>
             <a:r>
               <a:rPr lang="en-US" dirty="0"/>
-              <a:t>Finding which data to </a:t>
-            </a:r>
-            <a:r>
-              <a:rPr lang="en-US"/>
-              <a:t>focus on</a:t>
-            </a:r>
-            <a:endParaRPr lang="en-US" dirty="0"/>
+              <a:t>Finding which data to focus on</a:t>
+            </a:r>
           </a:p>
           <a:p>
             <a:pPr lvl="1" indent="0">
@@ -6646,6 +6877,14 @@
 <file path=ppt/slides/slide6.xml><?xml version="1.0" encoding="utf-8"?>
 <p:sld xmlns:a="http://schemas.openxmlformats.org/drawingml/2006/main" xmlns:r="http://schemas.openxmlformats.org/officeDocument/2006/relationships" xmlns:p="http://schemas.openxmlformats.org/presentationml/2006/main">
   <p:cSld>
+    <p:bg>
+      <p:bgPr>
+        <a:solidFill>
+          <a:schemeClr val="bg1"/>
+        </a:solidFill>
+        <a:effectLst/>
+      </p:bgPr>
+    </p:bg>
     <p:spTree>
       <p:nvGrpSpPr>
         <p:cNvPr id="1" name=""/>
@@ -6660,114 +6899,106 @@
           <a:chExt cx="0" cy="0"/>
         </a:xfrm>
       </p:grpSpPr>
-      <p:sp>
-        <p:nvSpPr>
-          <p:cNvPr id="2" name="Title 1">
-            <a:extLst>
-              <a:ext uri="{FF2B5EF4-FFF2-40B4-BE49-F238E27FC236}">
-                <a16:creationId xmlns:a16="http://schemas.microsoft.com/office/drawing/2014/main" id="{8DC2469B-491B-449B-BBAF-62C42A10CBD8}"/>
-              </a:ext>
-            </a:extLst>
-          </p:cNvPr>
-          <p:cNvSpPr>
-            <a:spLocks noGrp="1"/>
-          </p:cNvSpPr>
-          <p:nvPr>
-            <p:ph type="title"/>
-          </p:nvPr>
-        </p:nvSpPr>
-        <p:spPr/>
-        <p:txBody>
-          <a:bodyPr/>
-          <a:lstStyle/>
-          <a:p>
-            <a:r>
-              <a:rPr lang="en-US" dirty="0"/>
-              <a:t>Analysis phase</a:t>
-            </a:r>
-          </a:p>
-        </p:txBody>
-      </p:sp>
-      <p:sp>
-        <p:nvSpPr>
-          <p:cNvPr id="3" name="Content Placeholder 2">
-            <a:extLst>
-              <a:ext uri="{FF2B5EF4-FFF2-40B4-BE49-F238E27FC236}">
-                <a16:creationId xmlns:a16="http://schemas.microsoft.com/office/drawing/2014/main" id="{135F1482-E208-49C4-9C5B-CC00A1E8831F}"/>
-              </a:ext>
-            </a:extLst>
-          </p:cNvPr>
-          <p:cNvSpPr>
-            <a:spLocks noGrp="1"/>
-          </p:cNvSpPr>
+      <p:sp useBgFill="1">
+        <p:nvSpPr>
+          <p:cNvPr id="16" name="Rectangle 15">
+            <a:extLst>
+              <a:ext uri="{FF2B5EF4-FFF2-40B4-BE49-F238E27FC236}">
+                <a16:creationId xmlns:a16="http://schemas.microsoft.com/office/drawing/2014/main" id="{6BC377B7-18F1-42AD-A1DD-E1D6A5B27CE9}"/>
+              </a:ext>
+              <a:ext uri="{C183D7F6-B498-43B3-948B-1728B52AA6E4}">
+                <adec:decorative xmlns:adec="http://schemas.microsoft.com/office/drawing/2017/decorative" val="1"/>
+              </a:ext>
+            </a:extLst>
+          </p:cNvPr>
+          <p:cNvSpPr>
+            <a:spLocks noGrp="1" noRot="1" noChangeAspect="1" noMove="1" noResize="1" noEditPoints="1" noAdjustHandles="1" noChangeArrowheads="1" noChangeShapeType="1" noTextEdit="1"/>
+          </p:cNvSpPr>
+          <p:nvPr>
+            <p:extLst>
+              <p:ext uri="{386F3935-93C4-4BCD-93E2-E3B085C9AB24}">
+                <p16:designElem xmlns:p16="http://schemas.microsoft.com/office/powerpoint/2015/main" val="1"/>
+              </p:ext>
+            </p:extLst>
+          </p:nvPr>
+        </p:nvSpPr>
+        <p:spPr>
+          <a:xfrm>
+            <a:off x="0" y="0"/>
+            <a:ext cx="12192000" cy="6858000"/>
+          </a:xfrm>
+          <a:prstGeom prst="rect">
+            <a:avLst/>
+          </a:prstGeom>
+          <a:ln>
+            <a:noFill/>
+          </a:ln>
+        </p:spPr>
+        <p:style>
+          <a:lnRef idx="2">
+            <a:schemeClr val="accent1">
+              <a:shade val="50000"/>
+            </a:schemeClr>
+          </a:lnRef>
+          <a:fillRef idx="1">
+            <a:schemeClr val="accent1"/>
+          </a:fillRef>
+          <a:effectRef idx="0">
+            <a:schemeClr val="accent1"/>
+          </a:effectRef>
+          <a:fontRef idx="minor">
+            <a:schemeClr val="lt1"/>
+          </a:fontRef>
+        </p:style>
+        <p:txBody>
+          <a:bodyPr rtlCol="0" anchor="ctr"/>
+          <a:lstStyle/>
+          <a:p>
+            <a:pPr algn="ctr"/>
+            <a:endParaRPr lang="en-US"/>
+          </a:p>
+        </p:txBody>
+      </p:sp>
+      <p:pic>
+        <p:nvPicPr>
+          <p:cNvPr id="4" name="Content Placeholder 3">
+            <a:extLst>
+              <a:ext uri="{FF2B5EF4-FFF2-40B4-BE49-F238E27FC236}">
+                <a16:creationId xmlns:a16="http://schemas.microsoft.com/office/drawing/2014/main" id="{55B0D92C-A760-45A4-BE44-F23FDB40180B}"/>
+              </a:ext>
+            </a:extLst>
+          </p:cNvPr>
+          <p:cNvPicPr>
+            <a:picLocks noGrp="1"/>
+          </p:cNvPicPr>
           <p:nvPr>
             <p:ph idx="1"/>
           </p:nvPr>
-        </p:nvSpPr>
-        <p:spPr/>
-        <p:txBody>
-          <a:bodyPr/>
-          <a:lstStyle/>
-          <a:p>
-            <a:pPr marL="457200" indent="-457200">
-              <a:buFont typeface="Arial" panose="020B0604020202020204" pitchFamily="34" charset="0"/>
-              <a:buChar char="•"/>
-            </a:pPr>
-            <a:r>
-              <a:rPr lang="en-US" dirty="0"/>
-              <a:t>Figuring out which data to analyze</a:t>
-            </a:r>
-          </a:p>
-          <a:p>
-            <a:pPr marL="457200" indent="-457200">
-              <a:buFont typeface="Arial" panose="020B0604020202020204" pitchFamily="34" charset="0"/>
-              <a:buChar char="•"/>
-            </a:pPr>
-            <a:r>
-              <a:rPr lang="en-US" dirty="0"/>
-              <a:t>What methods we used to analyze the data</a:t>
-            </a:r>
-          </a:p>
-          <a:p>
-            <a:pPr marL="457200" indent="-457200">
-              <a:buFont typeface="Arial" panose="020B0604020202020204" pitchFamily="34" charset="0"/>
-              <a:buChar char="•"/>
-            </a:pPr>
-            <a:r>
-              <a:rPr lang="en-US" dirty="0"/>
-              <a:t>How will our machine analyze data</a:t>
-            </a:r>
-          </a:p>
-          <a:p>
-            <a:pPr marL="457200" indent="-457200">
-              <a:buFont typeface="Arial" panose="020B0604020202020204" pitchFamily="34" charset="0"/>
-              <a:buChar char="•"/>
-            </a:pPr>
-            <a:r>
-              <a:rPr lang="en-US" dirty="0"/>
-              <a:t>What is the purpose of analyzing the data</a:t>
-            </a:r>
-          </a:p>
-          <a:p>
-            <a:pPr marL="457200" indent="-457200">
-              <a:buFont typeface="Arial" panose="020B0604020202020204" pitchFamily="34" charset="0"/>
-              <a:buChar char="•"/>
-            </a:pPr>
-            <a:r>
-              <a:rPr lang="en-US" dirty="0"/>
-              <a:t>Analyzing results of </a:t>
-            </a:r>
-            <a:r>
-              <a:rPr lang="en-US"/>
-              <a:t>the machine</a:t>
-            </a:r>
-          </a:p>
-        </p:txBody>
-      </p:sp>
+        </p:nvPicPr>
+        <p:blipFill rotWithShape="1">
+          <a:blip r:embed="rId3"/>
+          <a:srcRect l="23847" t="16254" r="24783" b="11267"/>
+          <a:stretch/>
+        </p:blipFill>
+        <p:spPr bwMode="auto">
+          <a:xfrm>
+            <a:off x="2374210" y="0"/>
+            <a:ext cx="7170623" cy="6753152"/>
+          </a:xfrm>
+          <a:prstGeom prst="rect">
+            <a:avLst/>
+          </a:prstGeom>
+          <a:extLst>
+            <a:ext uri="{53640926-AAD7-44D8-BBD7-CCE9431645EC}">
+              <a14:shadowObscured xmlns:a14="http://schemas.microsoft.com/office/drawing/2010/main"/>
+            </a:ext>
+          </a:extLst>
+        </p:spPr>
+      </p:pic>
     </p:spTree>
     <p:extLst>
       <p:ext uri="{BB962C8B-B14F-4D97-AF65-F5344CB8AC3E}">
-        <p14:creationId xmlns:p14="http://schemas.microsoft.com/office/powerpoint/2010/main" val="933643513"/>
+        <p14:creationId xmlns:p14="http://schemas.microsoft.com/office/powerpoint/2010/main" val="3767825425"/>
       </p:ext>
     </p:extLst>
   </p:cSld>
@@ -6799,7 +7030,7 @@
           <p:cNvPr id="2" name="Title 1">
             <a:extLst>
               <a:ext uri="{FF2B5EF4-FFF2-40B4-BE49-F238E27FC236}">
-                <a16:creationId xmlns:a16="http://schemas.microsoft.com/office/drawing/2014/main" id="{7A8E0AB1-DBE1-451C-A032-485F6286E3F3}"/>
+                <a16:creationId xmlns:a16="http://schemas.microsoft.com/office/drawing/2014/main" id="{8DC2469B-491B-449B-BBAF-62C42A10CBD8}"/>
               </a:ext>
             </a:extLst>
           </p:cNvPr>
@@ -6812,14 +7043,12 @@
         </p:nvSpPr>
         <p:spPr/>
         <p:txBody>
-          <a:bodyPr>
-            <a:normAutofit fontScale="90000"/>
-          </a:bodyPr>
+          <a:bodyPr/>
           <a:lstStyle/>
           <a:p>
             <a:r>
               <a:rPr lang="en-US" dirty="0"/>
-              <a:t>Technologies, languages, tools</a:t>
+              <a:t>Analysis phase</a:t>
             </a:r>
           </a:p>
         </p:txBody>
@@ -6829,7 +7058,7 @@
           <p:cNvPr id="3" name="Content Placeholder 2">
             <a:extLst>
               <a:ext uri="{FF2B5EF4-FFF2-40B4-BE49-F238E27FC236}">
-                <a16:creationId xmlns:a16="http://schemas.microsoft.com/office/drawing/2014/main" id="{A612F5A8-3E12-43BD-8784-444B5C059B56}"/>
+                <a16:creationId xmlns:a16="http://schemas.microsoft.com/office/drawing/2014/main" id="{135F1482-E208-49C4-9C5B-CC00A1E8831F}"/>
               </a:ext>
             </a:extLst>
           </p:cNvPr>
@@ -6842,9 +7071,7 @@
         </p:nvSpPr>
         <p:spPr/>
         <p:txBody>
-          <a:bodyPr>
-            <a:normAutofit/>
-          </a:bodyPr>
+          <a:bodyPr/>
           <a:lstStyle/>
           <a:p>
             <a:pPr marL="457200" indent="-457200">
@@ -6852,10 +7079,9 @@
               <a:buChar char="•"/>
             </a:pPr>
             <a:r>
-              <a:rPr lang="en-US" dirty="0" err="1"/>
-              <a:t>sportsipy</a:t>
-            </a:r>
-            <a:endParaRPr lang="en-US" dirty="0"/>
+              <a:rPr lang="en-US" dirty="0"/>
+              <a:t>Figuring out which data to analyze</a:t>
+            </a:r>
           </a:p>
           <a:p>
             <a:pPr marL="457200" indent="-457200">
@@ -6864,7 +7090,7 @@
             </a:pPr>
             <a:r>
               <a:rPr lang="en-US" dirty="0"/>
-              <a:t>Website for web scraping</a:t>
+              <a:t>What methods we used to analyze the data</a:t>
             </a:r>
           </a:p>
           <a:p>
@@ -6874,7 +7100,7 @@
             </a:pPr>
             <a:r>
               <a:rPr lang="en-US" dirty="0"/>
-              <a:t>Web scraping tool</a:t>
+              <a:t>How will our machine analyze data</a:t>
             </a:r>
           </a:p>
           <a:p>
@@ -6884,7 +7110,7 @@
             </a:pPr>
             <a:r>
               <a:rPr lang="en-US" dirty="0"/>
-              <a:t>Websites for NFL data</a:t>
+              <a:t>What is the purpose of analyzing the data</a:t>
             </a:r>
           </a:p>
           <a:p>
@@ -6894,26 +7120,19 @@
             </a:pPr>
             <a:r>
               <a:rPr lang="en-US" dirty="0"/>
-              <a:t>DraftKings</a:t>
-            </a:r>
-          </a:p>
-          <a:p>
-            <a:pPr marL="457200" indent="-457200">
-              <a:buFont typeface="Arial" panose="020B0604020202020204" pitchFamily="34" charset="0"/>
-              <a:buChar char="•"/>
-            </a:pPr>
+              <a:t>Analyzing results of </a:t>
+            </a:r>
             <a:r>
               <a:rPr lang="en-US"/>
-              <a:t>Languages--</a:t>
-            </a:r>
-            <a:endParaRPr lang="en-US" dirty="0"/>
+              <a:t>the machine</a:t>
+            </a:r>
           </a:p>
         </p:txBody>
       </p:sp>
     </p:spTree>
     <p:extLst>
       <p:ext uri="{BB962C8B-B14F-4D97-AF65-F5344CB8AC3E}">
-        <p14:creationId xmlns:p14="http://schemas.microsoft.com/office/powerpoint/2010/main" val="2869901700"/>
+        <p14:creationId xmlns:p14="http://schemas.microsoft.com/office/powerpoint/2010/main" val="933643513"/>
       </p:ext>
     </p:extLst>
   </p:cSld>
@@ -6945,7 +7164,7 @@
           <p:cNvPr id="2" name="Title 1">
             <a:extLst>
               <a:ext uri="{FF2B5EF4-FFF2-40B4-BE49-F238E27FC236}">
-                <a16:creationId xmlns:a16="http://schemas.microsoft.com/office/drawing/2014/main" id="{DC884FA8-97A7-42A3-B4A8-6475A65F7904}"/>
+                <a16:creationId xmlns:a16="http://schemas.microsoft.com/office/drawing/2014/main" id="{7A8E0AB1-DBE1-451C-A032-485F6286E3F3}"/>
               </a:ext>
             </a:extLst>
           </p:cNvPr>
@@ -6958,10 +7177,15 @@
         </p:nvSpPr>
         <p:spPr/>
         <p:txBody>
-          <a:bodyPr/>
-          <a:lstStyle/>
-          <a:p>
-            <a:endParaRPr lang="en-US"/>
+          <a:bodyPr>
+            <a:normAutofit fontScale="90000"/>
+          </a:bodyPr>
+          <a:lstStyle/>
+          <a:p>
+            <a:r>
+              <a:rPr lang="en-US" dirty="0"/>
+              <a:t>Technologies, languages, tools</a:t>
+            </a:r>
           </a:p>
         </p:txBody>
       </p:sp>
@@ -6970,7 +7194,7 @@
           <p:cNvPr id="3" name="Content Placeholder 2">
             <a:extLst>
               <a:ext uri="{FF2B5EF4-FFF2-40B4-BE49-F238E27FC236}">
-                <a16:creationId xmlns:a16="http://schemas.microsoft.com/office/drawing/2014/main" id="{AE0B144A-0F7A-49F4-A7FE-EFD985425F1F}"/>
+                <a16:creationId xmlns:a16="http://schemas.microsoft.com/office/drawing/2014/main" id="{A612F5A8-3E12-43BD-8784-444B5C059B56}"/>
               </a:ext>
             </a:extLst>
           </p:cNvPr>
@@ -6983,17 +7207,78 @@
         </p:nvSpPr>
         <p:spPr/>
         <p:txBody>
-          <a:bodyPr/>
-          <a:lstStyle/>
-          <a:p>
-            <a:endParaRPr lang="en-US"/>
+          <a:bodyPr>
+            <a:normAutofit/>
+          </a:bodyPr>
+          <a:lstStyle/>
+          <a:p>
+            <a:pPr marL="457200" indent="-457200">
+              <a:buFont typeface="Arial" panose="020B0604020202020204" pitchFamily="34" charset="0"/>
+              <a:buChar char="•"/>
+            </a:pPr>
+            <a:r>
+              <a:rPr lang="en-US" dirty="0" err="1"/>
+              <a:t>sportsipy</a:t>
+            </a:r>
+            <a:endParaRPr lang="en-US" dirty="0"/>
+          </a:p>
+          <a:p>
+            <a:pPr marL="457200" indent="-457200">
+              <a:buFont typeface="Arial" panose="020B0604020202020204" pitchFamily="34" charset="0"/>
+              <a:buChar char="•"/>
+            </a:pPr>
+            <a:r>
+              <a:rPr lang="en-US" dirty="0"/>
+              <a:t>Website for web scraping</a:t>
+            </a:r>
+          </a:p>
+          <a:p>
+            <a:pPr marL="457200" indent="-457200">
+              <a:buFont typeface="Arial" panose="020B0604020202020204" pitchFamily="34" charset="0"/>
+              <a:buChar char="•"/>
+            </a:pPr>
+            <a:r>
+              <a:rPr lang="en-US" dirty="0"/>
+              <a:t>Web scraping tool</a:t>
+            </a:r>
+          </a:p>
+          <a:p>
+            <a:pPr marL="457200" indent="-457200">
+              <a:buFont typeface="Arial" panose="020B0604020202020204" pitchFamily="34" charset="0"/>
+              <a:buChar char="•"/>
+            </a:pPr>
+            <a:r>
+              <a:rPr lang="en-US" dirty="0"/>
+              <a:t>Websites for NFL data</a:t>
+            </a:r>
+          </a:p>
+          <a:p>
+            <a:pPr marL="457200" indent="-457200">
+              <a:buFont typeface="Arial" panose="020B0604020202020204" pitchFamily="34" charset="0"/>
+              <a:buChar char="•"/>
+            </a:pPr>
+            <a:r>
+              <a:rPr lang="en-US" dirty="0"/>
+              <a:t>DraftKings</a:t>
+            </a:r>
+          </a:p>
+          <a:p>
+            <a:pPr marL="457200" indent="-457200">
+              <a:buFont typeface="Arial" panose="020B0604020202020204" pitchFamily="34" charset="0"/>
+              <a:buChar char="•"/>
+            </a:pPr>
+            <a:r>
+              <a:rPr lang="en-US"/>
+              <a:t>Languages--</a:t>
+            </a:r>
+            <a:endParaRPr lang="en-US" dirty="0"/>
           </a:p>
         </p:txBody>
       </p:sp>
     </p:spTree>
     <p:extLst>
       <p:ext uri="{BB962C8B-B14F-4D97-AF65-F5344CB8AC3E}">
-        <p14:creationId xmlns:p14="http://schemas.microsoft.com/office/powerpoint/2010/main" val="642101144"/>
+        <p14:creationId xmlns:p14="http://schemas.microsoft.com/office/powerpoint/2010/main" val="2869901700"/>
       </p:ext>
     </p:extLst>
   </p:cSld>
@@ -7025,7 +7310,7 @@
           <p:cNvPr id="2" name="Title 1">
             <a:extLst>
               <a:ext uri="{FF2B5EF4-FFF2-40B4-BE49-F238E27FC236}">
-                <a16:creationId xmlns:a16="http://schemas.microsoft.com/office/drawing/2014/main" id="{00A15753-9A0A-46A0-827A-191A50197E37}"/>
+                <a16:creationId xmlns:a16="http://schemas.microsoft.com/office/drawing/2014/main" id="{DC884FA8-97A7-42A3-B4A8-6475A65F7904}"/>
               </a:ext>
             </a:extLst>
           </p:cNvPr>
@@ -7050,7 +7335,7 @@
           <p:cNvPr id="3" name="Content Placeholder 2">
             <a:extLst>
               <a:ext uri="{FF2B5EF4-FFF2-40B4-BE49-F238E27FC236}">
-                <a16:creationId xmlns:a16="http://schemas.microsoft.com/office/drawing/2014/main" id="{03CA9E21-7364-4DA9-8E97-33FFAA50BF9C}"/>
+                <a16:creationId xmlns:a16="http://schemas.microsoft.com/office/drawing/2014/main" id="{AE0B144A-0F7A-49F4-A7FE-EFD985425F1F}"/>
               </a:ext>
             </a:extLst>
           </p:cNvPr>
@@ -7073,7 +7358,7 @@
     </p:spTree>
     <p:extLst>
       <p:ext uri="{BB962C8B-B14F-4D97-AF65-F5344CB8AC3E}">
-        <p14:creationId xmlns:p14="http://schemas.microsoft.com/office/powerpoint/2010/main" val="1993694396"/>
+        <p14:creationId xmlns:p14="http://schemas.microsoft.com/office/powerpoint/2010/main" val="642101144"/>
       </p:ext>
     </p:extLst>
   </p:cSld>

</xml_diff>

<commit_message>
Data exploration more in depth
</commit_message>
<xml_diff>
--- a/Resources/Final.Presentation.pptx
+++ b/Resources/Final.Presentation.pptx
@@ -128,7 +128,7 @@
 <file path=ppt/revisionInfo.xml><?xml version="1.0" encoding="utf-8"?>
 <p1510:revInfo xmlns:a="http://schemas.openxmlformats.org/drawingml/2006/main" xmlns:r="http://schemas.openxmlformats.org/officeDocument/2006/relationships" xmlns:p1510="http://schemas.microsoft.com/office/powerpoint/2015/10/main">
   <p1510:revLst>
-    <p1510:client id="{2D2F4B00-D67B-471E-8EC5-16430E5C6708}" v="13" dt="2021-11-08T04:13:36.447"/>
+    <p1510:client id="{2D2F4B00-D67B-471E-8EC5-16430E5C6708}" v="15" dt="2021-11-08T04:15:49.305"/>
   </p1510:revLst>
 </p1510:revInfo>
 </file>
@@ -138,7 +138,7 @@
   <pc:docChgLst>
     <pc:chgData name="Taryn Syler" userId="d093462dc93fe5e1" providerId="LiveId" clId="{2D2F4B00-D67B-471E-8EC5-16430E5C6708}"/>
     <pc:docChg chg="undo custSel addSld modSld">
-      <pc:chgData name="Taryn Syler" userId="d093462dc93fe5e1" providerId="LiveId" clId="{2D2F4B00-D67B-471E-8EC5-16430E5C6708}" dt="2021-11-08T04:13:44.173" v="3166" actId="20577"/>
+      <pc:chgData name="Taryn Syler" userId="d093462dc93fe5e1" providerId="LiveId" clId="{2D2F4B00-D67B-471E-8EC5-16430E5C6708}" dt="2021-11-08T04:22:16.750" v="3797" actId="20577"/>
       <pc:docMkLst>
         <pc:docMk/>
       </pc:docMkLst>
@@ -277,17 +277,33 @@
         </pc:picChg>
       </pc:sldChg>
       <pc:sldChg chg="addSp delSp modSp new mod setBg modNotesTx">
-        <pc:chgData name="Taryn Syler" userId="d093462dc93fe5e1" providerId="LiveId" clId="{2D2F4B00-D67B-471E-8EC5-16430E5C6708}" dt="2021-10-25T04:22:10.716" v="1955" actId="26606"/>
+        <pc:chgData name="Taryn Syler" userId="d093462dc93fe5e1" providerId="LiveId" clId="{2D2F4B00-D67B-471E-8EC5-16430E5C6708}" dt="2021-11-08T04:15:53.932" v="3183"/>
         <pc:sldMkLst>
           <pc:docMk/>
           <pc:sldMk cId="218487303" sldId="259"/>
         </pc:sldMkLst>
+        <pc:spChg chg="add del mod">
+          <ac:chgData name="Taryn Syler" userId="d093462dc93fe5e1" providerId="LiveId" clId="{2D2F4B00-D67B-471E-8EC5-16430E5C6708}" dt="2021-11-08T04:15:53.932" v="3183"/>
+          <ac:spMkLst>
+            <pc:docMk/>
+            <pc:sldMk cId="218487303" sldId="259"/>
+            <ac:spMk id="2" creationId="{59B6DFC2-FB7D-44F3-A93A-70AC7210EC16}"/>
+          </ac:spMkLst>
+        </pc:spChg>
         <pc:spChg chg="del">
           <ac:chgData name="Taryn Syler" userId="d093462dc93fe5e1" providerId="LiveId" clId="{2D2F4B00-D67B-471E-8EC5-16430E5C6708}" dt="2021-10-25T04:21:39.882" v="1953" actId="26606"/>
           <ac:spMkLst>
             <pc:docMk/>
             <pc:sldMk cId="218487303" sldId="259"/>
             <ac:spMk id="2" creationId="{A5544B47-BB39-449A-AB86-CD14F16C063B}"/>
+          </ac:spMkLst>
+        </pc:spChg>
+        <pc:spChg chg="add mod">
+          <ac:chgData name="Taryn Syler" userId="d093462dc93fe5e1" providerId="LiveId" clId="{2D2F4B00-D67B-471E-8EC5-16430E5C6708}" dt="2021-11-08T04:15:53.013" v="3181" actId="20577"/>
+          <ac:spMkLst>
+            <pc:docMk/>
+            <pc:sldMk cId="218487303" sldId="259"/>
+            <ac:spMk id="3" creationId="{26DB3B77-C1ED-493E-9100-9508FB819340}"/>
           </ac:spMkLst>
         </pc:spChg>
         <pc:spChg chg="del">
@@ -332,7 +348,7 @@
         </pc:picChg>
       </pc:sldChg>
       <pc:sldChg chg="addSp delSp modSp new mod modNotesTx">
-        <pc:chgData name="Taryn Syler" userId="d093462dc93fe5e1" providerId="LiveId" clId="{2D2F4B00-D67B-471E-8EC5-16430E5C6708}" dt="2021-11-08T04:12:45.613" v="3110" actId="21"/>
+        <pc:chgData name="Taryn Syler" userId="d093462dc93fe5e1" providerId="LiveId" clId="{2D2F4B00-D67B-471E-8EC5-16430E5C6708}" dt="2021-11-08T04:22:16.750" v="3797" actId="20577"/>
         <pc:sldMkLst>
           <pc:docMk/>
           <pc:sldMk cId="2730496532" sldId="260"/>
@@ -346,7 +362,7 @@
           </ac:spMkLst>
         </pc:spChg>
         <pc:spChg chg="mod">
-          <ac:chgData name="Taryn Syler" userId="d093462dc93fe5e1" providerId="LiveId" clId="{2D2F4B00-D67B-471E-8EC5-16430E5C6708}" dt="2021-11-08T04:12:42.936" v="3108"/>
+          <ac:chgData name="Taryn Syler" userId="d093462dc93fe5e1" providerId="LiveId" clId="{2D2F4B00-D67B-471E-8EC5-16430E5C6708}" dt="2021-11-08T04:20:34.443" v="3525" actId="20577"/>
           <ac:spMkLst>
             <pc:docMk/>
             <pc:sldMk cId="2730496532" sldId="260"/>
@@ -579,7 +595,7 @@
           <a:p>
             <a:fld id="{917E58E4-3C21-4D5C-B4E1-FAE723A9F180}" type="datetimeFigureOut">
               <a:rPr lang="en-US" smtClean="0"/>
-              <a:t>11/2/2021</a:t>
+              <a:t>11/7/2021</a:t>
             </a:fld>
             <a:endParaRPr lang="en-US"/>
           </a:p>
@@ -1276,7 +1292,23 @@
           <a:p>
             <a:r>
               <a:rPr lang="en-US" dirty="0"/>
-              <a:t>Description of the data exploration phase of the project: </a:t>
+              <a:t>Description of the data exploration phase of the project: (Jabari) Data was divided into week, player, position. Machine learning used to predict player performance, allowing us to construct ideal draft picks. Data obtained from (DraftKings) and (</a:t>
+            </a:r>
+            <a:r>
+              <a:rPr lang="en-US" dirty="0" err="1"/>
+              <a:t>Sportsipy</a:t>
+            </a:r>
+            <a:r>
+              <a:rPr lang="en-US" dirty="0"/>
+              <a:t>). When obtaining data, issues came across with </a:t>
+            </a:r>
+            <a:r>
+              <a:rPr lang="en-US" dirty="0" err="1"/>
+              <a:t>sportsipy</a:t>
+            </a:r>
+            <a:r>
+              <a:rPr lang="en-US" dirty="0"/>
+              <a:t> and web scraping had to be involved to get appropriate info. </a:t>
             </a:r>
           </a:p>
         </p:txBody>
@@ -1975,7 +2007,7 @@
             <a:fld id="{A37D6D71-8B28-4ED6-B932-04B197003D23}" type="datetimeFigureOut">
               <a:rPr lang="en-US" smtClean="0"/>
               <a:pPr algn="r"/>
-              <a:t>11/2/2021</a:t>
+              <a:t>11/7/2021</a:t>
             </a:fld>
             <a:endParaRPr lang="en-US" dirty="0"/>
           </a:p>
@@ -2197,7 +2229,7 @@
             <a:fld id="{A37D6D71-8B28-4ED6-B932-04B197003D23}" type="datetimeFigureOut">
               <a:rPr lang="en-US" smtClean="0"/>
               <a:pPr algn="r"/>
-              <a:t>11/2/2021</a:t>
+              <a:t>11/7/2021</a:t>
             </a:fld>
             <a:endParaRPr lang="en-US" dirty="0"/>
           </a:p>
@@ -2480,7 +2512,7 @@
             <a:fld id="{A37D6D71-8B28-4ED6-B932-04B197003D23}" type="datetimeFigureOut">
               <a:rPr lang="en-US" smtClean="0"/>
               <a:pPr algn="r"/>
-              <a:t>11/2/2021</a:t>
+              <a:t>11/7/2021</a:t>
             </a:fld>
             <a:endParaRPr lang="en-US" dirty="0"/>
           </a:p>
@@ -2694,7 +2726,7 @@
             <a:fld id="{A37D6D71-8B28-4ED6-B932-04B197003D23}" type="datetimeFigureOut">
               <a:rPr lang="en-US" smtClean="0"/>
               <a:pPr algn="r"/>
-              <a:t>11/2/2021</a:t>
+              <a:t>11/7/2021</a:t>
             </a:fld>
             <a:endParaRPr lang="en-US" dirty="0"/>
           </a:p>
@@ -3032,7 +3064,7 @@
             <a:fld id="{A37D6D71-8B28-4ED6-B932-04B197003D23}" type="datetimeFigureOut">
               <a:rPr lang="en-US" smtClean="0"/>
               <a:pPr algn="r"/>
-              <a:t>11/2/2021</a:t>
+              <a:t>11/7/2021</a:t>
             </a:fld>
             <a:endParaRPr lang="en-US" dirty="0"/>
           </a:p>
@@ -3307,7 +3339,7 @@
             <a:fld id="{A37D6D71-8B28-4ED6-B932-04B197003D23}" type="datetimeFigureOut">
               <a:rPr lang="en-US" smtClean="0"/>
               <a:pPr algn="r"/>
-              <a:t>11/2/2021</a:t>
+              <a:t>11/7/2021</a:t>
             </a:fld>
             <a:endParaRPr lang="en-US" dirty="0"/>
           </a:p>
@@ -3696,7 +3728,7 @@
             <a:fld id="{A37D6D71-8B28-4ED6-B932-04B197003D23}" type="datetimeFigureOut">
               <a:rPr lang="en-US" smtClean="0"/>
               <a:pPr algn="r"/>
-              <a:t>11/2/2021</a:t>
+              <a:t>11/7/2021</a:t>
             </a:fld>
             <a:endParaRPr lang="en-US" dirty="0"/>
           </a:p>
@@ -3873,7 +3905,7 @@
             <a:fld id="{A37D6D71-8B28-4ED6-B932-04B197003D23}" type="datetimeFigureOut">
               <a:rPr lang="en-US" smtClean="0"/>
               <a:pPr algn="r"/>
-              <a:t>11/2/2021</a:t>
+              <a:t>11/7/2021</a:t>
             </a:fld>
             <a:endParaRPr lang="en-US" dirty="0"/>
           </a:p>
@@ -3994,7 +4026,7 @@
             <a:fld id="{A37D6D71-8B28-4ED6-B932-04B197003D23}" type="datetimeFigureOut">
               <a:rPr lang="en-US" smtClean="0"/>
               <a:pPr algn="r"/>
-              <a:t>11/2/2021</a:t>
+              <a:t>11/7/2021</a:t>
             </a:fld>
             <a:endParaRPr lang="en-US" dirty="0"/>
           </a:p>
@@ -4279,7 +4311,7 @@
             <a:fld id="{A37D6D71-8B28-4ED6-B932-04B197003D23}" type="datetimeFigureOut">
               <a:rPr lang="en-US" smtClean="0"/>
               <a:pPr algn="r"/>
-              <a:t>11/2/2021</a:t>
+              <a:t>11/7/2021</a:t>
             </a:fld>
             <a:endParaRPr lang="en-US" dirty="0"/>
           </a:p>
@@ -4580,7 +4612,7 @@
             <a:fld id="{A37D6D71-8B28-4ED6-B932-04B197003D23}" type="datetimeFigureOut">
               <a:rPr lang="en-US" smtClean="0"/>
               <a:pPr algn="r"/>
-              <a:t>11/2/2021</a:t>
+              <a:t>11/7/2021</a:t>
             </a:fld>
             <a:endParaRPr lang="en-US" dirty="0"/>
           </a:p>
@@ -4928,7 +4960,7 @@
             <a:fld id="{A37D6D71-8B28-4ED6-B932-04B197003D23}" type="datetimeFigureOut">
               <a:rPr lang="en-US" smtClean="0"/>
               <a:pPr algn="r"/>
-              <a:t>11/2/2021</a:t>
+              <a:t>11/7/2021</a:t>
             </a:fld>
             <a:endParaRPr lang="en-US" spc="50" dirty="0"/>
           </a:p>
@@ -6735,6 +6767,41 @@
           </a:extLst>
         </p:spPr>
       </p:pic>
+      <p:sp>
+        <p:nvSpPr>
+          <p:cNvPr id="3" name="TextBox 2">
+            <a:extLst>
+              <a:ext uri="{FF2B5EF4-FFF2-40B4-BE49-F238E27FC236}">
+                <a16:creationId xmlns:a16="http://schemas.microsoft.com/office/drawing/2014/main" id="{26DB3B77-C1ED-493E-9100-9508FB819340}"/>
+              </a:ext>
+            </a:extLst>
+          </p:cNvPr>
+          <p:cNvSpPr txBox="1"/>
+          <p:nvPr/>
+        </p:nvSpPr>
+        <p:spPr>
+          <a:xfrm>
+            <a:off x="457200" y="427383"/>
+            <a:ext cx="1451113" cy="369332"/>
+          </a:xfrm>
+          <a:prstGeom prst="rect">
+            <a:avLst/>
+          </a:prstGeom>
+          <a:noFill/>
+        </p:spPr>
+        <p:txBody>
+          <a:bodyPr wrap="square" rtlCol="0">
+            <a:spAutoFit/>
+          </a:bodyPr>
+          <a:lstStyle/>
+          <a:p>
+            <a:r>
+              <a:rPr lang="en-US" dirty="0"/>
+              <a:t>Placeholder</a:t>
+            </a:r>
+          </a:p>
+        </p:txBody>
+      </p:sp>
     </p:spTree>
     <p:extLst>
       <p:ext uri="{BB962C8B-B14F-4D97-AF65-F5344CB8AC3E}">
@@ -6811,7 +6878,9 @@
         </p:nvSpPr>
         <p:spPr/>
         <p:txBody>
-          <a:bodyPr/>
+          <a:bodyPr>
+            <a:normAutofit/>
+          </a:bodyPr>
           <a:lstStyle/>
           <a:p>
             <a:pPr marL="457200" indent="-457200">
@@ -6819,8 +6888,8 @@
               <a:buChar char="•"/>
             </a:pPr>
             <a:r>
-              <a:rPr lang="en-US" dirty="0"/>
-              <a:t>Screenshot or example of the data we found through external sources</a:t>
+              <a:rPr lang="en-US" sz="4000" b="1" dirty="0"/>
+              <a:t>Data of Interest: Week, Player, Position (NFL)</a:t>
             </a:r>
           </a:p>
           <a:p>
@@ -6829,18 +6898,8 @@
               <a:buChar char="•"/>
             </a:pPr>
             <a:r>
-              <a:rPr lang="en-US" dirty="0"/>
-              <a:t>Issues that came up</a:t>
-            </a:r>
-          </a:p>
-          <a:p>
-            <a:pPr marL="731520" lvl="1" indent="-457200">
-              <a:buFont typeface="Arial" panose="020B0604020202020204" pitchFamily="34" charset="0"/>
-              <a:buChar char="•"/>
-            </a:pPr>
-            <a:r>
-              <a:rPr lang="en-US" dirty="0"/>
-              <a:t>Potentially put this section later, when talking about doing things differently in the future</a:t>
+              <a:rPr lang="en-US" sz="4000" b="1" dirty="0"/>
+              <a:t>DraftKings</a:t>
             </a:r>
           </a:p>
           <a:p>
@@ -6849,15 +6908,17 @@
               <a:buChar char="•"/>
             </a:pPr>
             <a:r>
-              <a:rPr lang="en-US" dirty="0"/>
-              <a:t>Finding which data to focus on</a:t>
-            </a:r>
-          </a:p>
-          <a:p>
-            <a:pPr lvl="1" indent="0">
-              <a:buNone/>
-            </a:pPr>
-            <a:endParaRPr lang="en-US" dirty="0"/>
+              <a:rPr lang="en-US" sz="4000" b="1" dirty="0"/>
+              <a:t>Issues-Web</a:t>
+            </a:r>
+            <a:r>
+              <a:rPr lang="en-US" sz="4000" dirty="0"/>
+              <a:t> </a:t>
+            </a:r>
+            <a:r>
+              <a:rPr lang="en-US" sz="4000" b="1" dirty="0"/>
+              <a:t>Scraping</a:t>
+            </a:r>
           </a:p>
         </p:txBody>
       </p:sp>

</xml_diff>

<commit_message>
Final Final Presentation with added visuals
</commit_message>
<xml_diff>
--- a/Resources/Final.Presentation.pptx
+++ b/Resources/Final.Presentation.pptx
@@ -6,7 +6,7 @@
     <p:sldMasterId id="2147483674" r:id="rId2"/>
   </p:sldMasterIdLst>
   <p:notesMasterIdLst>
-    <p:notesMasterId r:id="rId22"/>
+    <p:notesMasterId r:id="rId23"/>
   </p:notesMasterIdLst>
   <p:sldIdLst>
     <p:sldId id="256" r:id="rId3"/>
@@ -21,13 +21,14 @@
     <p:sldId id="259" r:id="rId12"/>
     <p:sldId id="277" r:id="rId13"/>
     <p:sldId id="268" r:id="rId14"/>
-    <p:sldId id="273" r:id="rId15"/>
-    <p:sldId id="279" r:id="rId16"/>
-    <p:sldId id="274" r:id="rId17"/>
-    <p:sldId id="284" r:id="rId18"/>
-    <p:sldId id="283" r:id="rId19"/>
-    <p:sldId id="264" r:id="rId20"/>
-    <p:sldId id="280" r:id="rId21"/>
+    <p:sldId id="285" r:id="rId15"/>
+    <p:sldId id="273" r:id="rId16"/>
+    <p:sldId id="279" r:id="rId17"/>
+    <p:sldId id="274" r:id="rId18"/>
+    <p:sldId id="284" r:id="rId19"/>
+    <p:sldId id="283" r:id="rId20"/>
+    <p:sldId id="264" r:id="rId21"/>
+    <p:sldId id="280" r:id="rId22"/>
   </p:sldIdLst>
   <p:sldSz cx="12192000" cy="6858000"/>
   <p:notesSz cx="6858000" cy="9144000"/>
@@ -137,7 +138,7 @@
 <file path=ppt/revisionInfo.xml><?xml version="1.0" encoding="utf-8"?>
 <p1510:revInfo xmlns:a="http://schemas.openxmlformats.org/drawingml/2006/main" xmlns:r="http://schemas.openxmlformats.org/officeDocument/2006/relationships" xmlns:p1510="http://schemas.microsoft.com/office/powerpoint/2015/10/main">
   <p1510:revLst>
-    <p1510:client id="{2D2F4B00-D67B-471E-8EC5-16430E5C6708}" v="36" dt="2021-11-19T01:59:24.209"/>
+    <p1510:client id="{2D2F4B00-D67B-471E-8EC5-16430E5C6708}" v="38" dt="2021-11-19T02:07:31.526"/>
   </p1510:revLst>
 </p1510:revInfo>
 </file>
@@ -147,7 +148,7 @@
   <pc:docChgLst>
     <pc:chgData name="Taryn Syler" userId="d093462dc93fe5e1" providerId="LiveId" clId="{2D2F4B00-D67B-471E-8EC5-16430E5C6708}"/>
     <pc:docChg chg="undo custSel addSld delSld modSld sldOrd delMainMaster">
-      <pc:chgData name="Taryn Syler" userId="d093462dc93fe5e1" providerId="LiveId" clId="{2D2F4B00-D67B-471E-8EC5-16430E5C6708}" dt="2021-11-19T01:59:29.334" v="5222" actId="2696"/>
+      <pc:chgData name="Taryn Syler" userId="d093462dc93fe5e1" providerId="LiveId" clId="{2D2F4B00-D67B-471E-8EC5-16430E5C6708}" dt="2021-11-19T02:08:20.981" v="5272" actId="1076"/>
       <pc:docMkLst>
         <pc:docMk/>
       </pc:docMkLst>
@@ -1369,6 +1370,69 @@
           <pc:sldMk cId="3041006224" sldId="284"/>
         </pc:sldMkLst>
       </pc:sldChg>
+      <pc:sldChg chg="addSp delSp modSp new mod setBg">
+        <pc:chgData name="Taryn Syler" userId="d093462dc93fe5e1" providerId="LiveId" clId="{2D2F4B00-D67B-471E-8EC5-16430E5C6708}" dt="2021-11-19T02:08:20.981" v="5272" actId="1076"/>
+        <pc:sldMkLst>
+          <pc:docMk/>
+          <pc:sldMk cId="2623708154" sldId="285"/>
+        </pc:sldMkLst>
+        <pc:spChg chg="mod">
+          <ac:chgData name="Taryn Syler" userId="d093462dc93fe5e1" providerId="LiveId" clId="{2D2F4B00-D67B-471E-8EC5-16430E5C6708}" dt="2021-11-19T02:08:20.981" v="5272" actId="1076"/>
+          <ac:spMkLst>
+            <pc:docMk/>
+            <pc:sldMk cId="2623708154" sldId="285"/>
+            <ac:spMk id="2" creationId="{242B0E94-2D3F-4DE2-AC63-D3FF77FB30B3}"/>
+          </ac:spMkLst>
+        </pc:spChg>
+        <pc:spChg chg="del">
+          <ac:chgData name="Taryn Syler" userId="d093462dc93fe5e1" providerId="LiveId" clId="{2D2F4B00-D67B-471E-8EC5-16430E5C6708}" dt="2021-11-19T02:07:07.833" v="5224"/>
+          <ac:spMkLst>
+            <pc:docMk/>
+            <pc:sldMk cId="2623708154" sldId="285"/>
+            <ac:spMk id="3" creationId="{65AC5925-D89C-4D39-9F51-03F14A3029C9}"/>
+          </ac:spMkLst>
+        </pc:spChg>
+        <pc:spChg chg="add">
+          <ac:chgData name="Taryn Syler" userId="d093462dc93fe5e1" providerId="LiveId" clId="{2D2F4B00-D67B-471E-8EC5-16430E5C6708}" dt="2021-11-19T02:07:38.110" v="5231" actId="26606"/>
+          <ac:spMkLst>
+            <pc:docMk/>
+            <pc:sldMk cId="2623708154" sldId="285"/>
+            <ac:spMk id="12" creationId="{09A1C012-8297-4361-ACE8-A2509FB18911}"/>
+          </ac:spMkLst>
+        </pc:spChg>
+        <pc:spChg chg="add">
+          <ac:chgData name="Taryn Syler" userId="d093462dc93fe5e1" providerId="LiveId" clId="{2D2F4B00-D67B-471E-8EC5-16430E5C6708}" dt="2021-11-19T02:07:38.110" v="5231" actId="26606"/>
+          <ac:spMkLst>
+            <pc:docMk/>
+            <pc:sldMk cId="2623708154" sldId="285"/>
+            <ac:spMk id="14" creationId="{4AA13AD3-0A4F-475A-BEBB-DEEFF5C096C3}"/>
+          </ac:spMkLst>
+        </pc:spChg>
+        <pc:spChg chg="add">
+          <ac:chgData name="Taryn Syler" userId="d093462dc93fe5e1" providerId="LiveId" clId="{2D2F4B00-D67B-471E-8EC5-16430E5C6708}" dt="2021-11-19T02:07:38.110" v="5231" actId="26606"/>
+          <ac:spMkLst>
+            <pc:docMk/>
+            <pc:sldMk cId="2623708154" sldId="285"/>
+            <ac:spMk id="16" creationId="{D65E0E3C-32F3-480B-9842-7611BBE2EE9F}"/>
+          </ac:spMkLst>
+        </pc:spChg>
+        <pc:picChg chg="add mod ord">
+          <ac:chgData name="Taryn Syler" userId="d093462dc93fe5e1" providerId="LiveId" clId="{2D2F4B00-D67B-471E-8EC5-16430E5C6708}" dt="2021-11-19T02:08:14.248" v="5269" actId="14100"/>
+          <ac:picMkLst>
+            <pc:docMk/>
+            <pc:sldMk cId="2623708154" sldId="285"/>
+            <ac:picMk id="5" creationId="{0B06DA64-2AEF-4B0D-9947-A8B585A24A77}"/>
+          </ac:picMkLst>
+        </pc:picChg>
+        <pc:picChg chg="add mod">
+          <ac:chgData name="Taryn Syler" userId="d093462dc93fe5e1" providerId="LiveId" clId="{2D2F4B00-D67B-471E-8EC5-16430E5C6708}" dt="2021-11-19T02:08:20.038" v="5271" actId="14100"/>
+          <ac:picMkLst>
+            <pc:docMk/>
+            <pc:sldMk cId="2623708154" sldId="285"/>
+            <ac:picMk id="7" creationId="{63766E45-F47D-440D-B690-13DAA015F10D}"/>
+          </ac:picMkLst>
+        </pc:picChg>
+      </pc:sldChg>
       <pc:sldMasterChg chg="del delSldLayout">
         <pc:chgData name="Taryn Syler" userId="d093462dc93fe5e1" providerId="LiveId" clId="{2D2F4B00-D67B-471E-8EC5-16430E5C6708}" dt="2021-11-19T01:59:29.334" v="5222" actId="2696"/>
         <pc:sldMasterMkLst>
@@ -1551,7 +1615,7 @@
           <a:p>
             <a:fld id="{917E58E4-3C21-4D5C-B4E1-FAE723A9F180}" type="datetimeFigureOut">
               <a:rPr lang="en-US" smtClean="0"/>
-              <a:t>11/16/2021</a:t>
+              <a:t>11/18/2021</a:t>
             </a:fld>
             <a:endParaRPr lang="en-US"/>
           </a:p>
@@ -2489,7 +2553,7 @@
           <a:p>
             <a:fld id="{8382AD83-B5DF-4BD6-AC2B-95FF0DEC3221}" type="slidenum">
               <a:rPr lang="en-US" smtClean="0"/>
-              <a:t>14</a:t>
+              <a:t>15</a:t>
             </a:fld>
             <a:endParaRPr lang="en-US"/>
           </a:p>
@@ -2576,7 +2640,7 @@
           <a:p>
             <a:fld id="{8382AD83-B5DF-4BD6-AC2B-95FF0DEC3221}" type="slidenum">
               <a:rPr lang="en-US" smtClean="0"/>
-              <a:t>18</a:t>
+              <a:t>19</a:t>
             </a:fld>
             <a:endParaRPr lang="en-US"/>
           </a:p>
@@ -2660,7 +2724,7 @@
           <a:p>
             <a:fld id="{8382AD83-B5DF-4BD6-AC2B-95FF0DEC3221}" type="slidenum">
               <a:rPr lang="en-US" smtClean="0"/>
-              <a:t>19</a:t>
+              <a:t>20</a:t>
             </a:fld>
             <a:endParaRPr lang="en-US"/>
           </a:p>
@@ -2901,7 +2965,7 @@
             <a:fld id="{A37D6D71-8B28-4ED6-B932-04B197003D23}" type="datetimeFigureOut">
               <a:rPr lang="en-US" smtClean="0"/>
               <a:pPr algn="r"/>
-              <a:t>11/16/2021</a:t>
+              <a:t>11/18/2021</a:t>
             </a:fld>
             <a:endParaRPr lang="en-US" dirty="0"/>
           </a:p>
@@ -3123,7 +3187,7 @@
             <a:fld id="{A37D6D71-8B28-4ED6-B932-04B197003D23}" type="datetimeFigureOut">
               <a:rPr lang="en-US" smtClean="0"/>
               <a:pPr algn="r"/>
-              <a:t>11/16/2021</a:t>
+              <a:t>11/18/2021</a:t>
             </a:fld>
             <a:endParaRPr lang="en-US" dirty="0"/>
           </a:p>
@@ -3406,7 +3470,7 @@
             <a:fld id="{A37D6D71-8B28-4ED6-B932-04B197003D23}" type="datetimeFigureOut">
               <a:rPr lang="en-US" smtClean="0"/>
               <a:pPr algn="r"/>
-              <a:t>11/16/2021</a:t>
+              <a:t>11/18/2021</a:t>
             </a:fld>
             <a:endParaRPr lang="en-US" dirty="0"/>
           </a:p>
@@ -13000,7 +13064,7 @@
             <a:fld id="{A37D6D71-8B28-4ED6-B932-04B197003D23}" type="datetimeFigureOut">
               <a:rPr lang="en-US" smtClean="0"/>
               <a:pPr algn="r"/>
-              <a:t>11/16/2021</a:t>
+              <a:t>11/18/2021</a:t>
             </a:fld>
             <a:endParaRPr lang="en-US" dirty="0"/>
           </a:p>
@@ -26919,7 +26983,7 @@
             <a:fld id="{A37D6D71-8B28-4ED6-B932-04B197003D23}" type="datetimeFigureOut">
               <a:rPr lang="en-US" smtClean="0"/>
               <a:pPr algn="r"/>
-              <a:t>11/16/2021</a:t>
+              <a:t>11/18/2021</a:t>
             </a:fld>
             <a:endParaRPr lang="en-US" dirty="0"/>
           </a:p>
@@ -27194,7 +27258,7 @@
             <a:fld id="{A37D6D71-8B28-4ED6-B932-04B197003D23}" type="datetimeFigureOut">
               <a:rPr lang="en-US" smtClean="0"/>
               <a:pPr algn="r"/>
-              <a:t>11/16/2021</a:t>
+              <a:t>11/18/2021</a:t>
             </a:fld>
             <a:endParaRPr lang="en-US" dirty="0"/>
           </a:p>
@@ -27583,7 +27647,7 @@
             <a:fld id="{A37D6D71-8B28-4ED6-B932-04B197003D23}" type="datetimeFigureOut">
               <a:rPr lang="en-US" smtClean="0"/>
               <a:pPr algn="r"/>
-              <a:t>11/16/2021</a:t>
+              <a:t>11/18/2021</a:t>
             </a:fld>
             <a:endParaRPr lang="en-US" dirty="0"/>
           </a:p>
@@ -27760,7 +27824,7 @@
             <a:fld id="{A37D6D71-8B28-4ED6-B932-04B197003D23}" type="datetimeFigureOut">
               <a:rPr lang="en-US" smtClean="0"/>
               <a:pPr algn="r"/>
-              <a:t>11/16/2021</a:t>
+              <a:t>11/18/2021</a:t>
             </a:fld>
             <a:endParaRPr lang="en-US" dirty="0"/>
           </a:p>
@@ -27881,7 +27945,7 @@
             <a:fld id="{A37D6D71-8B28-4ED6-B932-04B197003D23}" type="datetimeFigureOut">
               <a:rPr lang="en-US" smtClean="0"/>
               <a:pPr algn="r"/>
-              <a:t>11/16/2021</a:t>
+              <a:t>11/18/2021</a:t>
             </a:fld>
             <a:endParaRPr lang="en-US" dirty="0"/>
           </a:p>
@@ -28166,7 +28230,7 @@
             <a:fld id="{A37D6D71-8B28-4ED6-B932-04B197003D23}" type="datetimeFigureOut">
               <a:rPr lang="en-US" smtClean="0"/>
               <a:pPr algn="r"/>
-              <a:t>11/16/2021</a:t>
+              <a:t>11/18/2021</a:t>
             </a:fld>
             <a:endParaRPr lang="en-US" dirty="0"/>
           </a:p>
@@ -28467,7 +28531,7 @@
             <a:fld id="{A37D6D71-8B28-4ED6-B932-04B197003D23}" type="datetimeFigureOut">
               <a:rPr lang="en-US" smtClean="0"/>
               <a:pPr algn="r"/>
-              <a:t>11/16/2021</a:t>
+              <a:t>11/18/2021</a:t>
             </a:fld>
             <a:endParaRPr lang="en-US" dirty="0"/>
           </a:p>
@@ -28815,7 +28879,7 @@
             <a:fld id="{A37D6D71-8B28-4ED6-B932-04B197003D23}" type="datetimeFigureOut">
               <a:rPr lang="en-US" smtClean="0"/>
               <a:pPr algn="r"/>
-              <a:t>11/16/2021</a:t>
+              <a:t>11/18/2021</a:t>
             </a:fld>
             <a:endParaRPr lang="en-US" spc="50" dirty="0"/>
           </a:p>
@@ -37741,6 +37805,342 @@
       </p:grpSpPr>
       <p:sp>
         <p:nvSpPr>
+          <p:cNvPr id="12" name="Rectangle 11">
+            <a:extLst>
+              <a:ext uri="{FF2B5EF4-FFF2-40B4-BE49-F238E27FC236}">
+                <a16:creationId xmlns:a16="http://schemas.microsoft.com/office/drawing/2014/main" id="{09A1C012-8297-4361-ACE8-A2509FB18911}"/>
+              </a:ext>
+              <a:ext uri="{C183D7F6-B498-43B3-948B-1728B52AA6E4}">
+                <adec:decorative xmlns:adec="http://schemas.microsoft.com/office/drawing/2017/decorative" val="1"/>
+              </a:ext>
+            </a:extLst>
+          </p:cNvPr>
+          <p:cNvSpPr>
+            <a:spLocks noGrp="1" noRot="1" noChangeAspect="1" noMove="1" noResize="1" noEditPoints="1" noAdjustHandles="1" noChangeArrowheads="1" noChangeShapeType="1" noTextEdit="1"/>
+          </p:cNvSpPr>
+          <p:nvPr>
+            <p:extLst>
+              <p:ext uri="{386F3935-93C4-4BCD-93E2-E3B085C9AB24}">
+                <p16:designElem xmlns:p16="http://schemas.microsoft.com/office/powerpoint/2015/main" val="1"/>
+              </p:ext>
+            </p:extLst>
+          </p:nvPr>
+        </p:nvSpPr>
+        <p:spPr>
+          <a:xfrm>
+            <a:off x="0" y="4206240"/>
+            <a:ext cx="12192000" cy="2651760"/>
+          </a:xfrm>
+          <a:prstGeom prst="rect">
+            <a:avLst/>
+          </a:prstGeom>
+          <a:solidFill>
+            <a:schemeClr val="tx1"/>
+          </a:solidFill>
+          <a:ln>
+            <a:noFill/>
+          </a:ln>
+        </p:spPr>
+        <p:style>
+          <a:lnRef idx="2">
+            <a:schemeClr val="accent1">
+              <a:shade val="50000"/>
+            </a:schemeClr>
+          </a:lnRef>
+          <a:fillRef idx="1">
+            <a:schemeClr val="accent1"/>
+          </a:fillRef>
+          <a:effectRef idx="0">
+            <a:schemeClr val="accent1"/>
+          </a:effectRef>
+          <a:fontRef idx="minor">
+            <a:schemeClr val="lt1"/>
+          </a:fontRef>
+        </p:style>
+        <p:txBody>
+          <a:bodyPr rtlCol="0" anchor="ctr"/>
+          <a:lstStyle/>
+          <a:p>
+            <a:pPr algn="ctr"/>
+            <a:endParaRPr lang="en-US"/>
+          </a:p>
+        </p:txBody>
+      </p:sp>
+      <p:sp useBgFill="1">
+        <p:nvSpPr>
+          <p:cNvPr id="14" name="Rectangle 13">
+            <a:extLst>
+              <a:ext uri="{FF2B5EF4-FFF2-40B4-BE49-F238E27FC236}">
+                <a16:creationId xmlns:a16="http://schemas.microsoft.com/office/drawing/2014/main" id="{4AA13AD3-0A4F-475A-BEBB-DEEFF5C096C3}"/>
+              </a:ext>
+              <a:ext uri="{C183D7F6-B498-43B3-948B-1728B52AA6E4}">
+                <adec:decorative xmlns:adec="http://schemas.microsoft.com/office/drawing/2017/decorative" val="1"/>
+              </a:ext>
+            </a:extLst>
+          </p:cNvPr>
+          <p:cNvSpPr>
+            <a:spLocks noGrp="1" noRot="1" noChangeAspect="1" noMove="1" noResize="1" noEditPoints="1" noAdjustHandles="1" noChangeArrowheads="1" noChangeShapeType="1" noTextEdit="1"/>
+          </p:cNvSpPr>
+          <p:nvPr>
+            <p:extLst>
+              <p:ext uri="{386F3935-93C4-4BCD-93E2-E3B085C9AB24}">
+                <p16:designElem xmlns:p16="http://schemas.microsoft.com/office/powerpoint/2015/main" val="1"/>
+              </p:ext>
+            </p:extLst>
+          </p:nvPr>
+        </p:nvSpPr>
+        <p:spPr>
+          <a:xfrm>
+            <a:off x="0" y="0"/>
+            <a:ext cx="12192000" cy="6858000"/>
+          </a:xfrm>
+          <a:prstGeom prst="rect">
+            <a:avLst/>
+          </a:prstGeom>
+          <a:ln>
+            <a:noFill/>
+          </a:ln>
+        </p:spPr>
+        <p:style>
+          <a:lnRef idx="2">
+            <a:schemeClr val="accent1">
+              <a:shade val="50000"/>
+            </a:schemeClr>
+          </a:lnRef>
+          <a:fillRef idx="1">
+            <a:schemeClr val="accent1"/>
+          </a:fillRef>
+          <a:effectRef idx="0">
+            <a:schemeClr val="accent1"/>
+          </a:effectRef>
+          <a:fontRef idx="minor">
+            <a:schemeClr val="lt1"/>
+          </a:fontRef>
+        </p:style>
+        <p:txBody>
+          <a:bodyPr rtlCol="0" anchor="ctr"/>
+          <a:lstStyle/>
+          <a:p>
+            <a:pPr algn="ctr"/>
+            <a:endParaRPr lang="en-US"/>
+          </a:p>
+        </p:txBody>
+      </p:sp>
+      <p:sp>
+        <p:nvSpPr>
+          <p:cNvPr id="16" name="Rectangle 15">
+            <a:extLst>
+              <a:ext uri="{FF2B5EF4-FFF2-40B4-BE49-F238E27FC236}">
+                <a16:creationId xmlns:a16="http://schemas.microsoft.com/office/drawing/2014/main" id="{D65E0E3C-32F3-480B-9842-7611BBE2EE9F}"/>
+              </a:ext>
+              <a:ext uri="{C183D7F6-B498-43B3-948B-1728B52AA6E4}">
+                <adec:decorative xmlns:adec="http://schemas.microsoft.com/office/drawing/2017/decorative" val="1"/>
+              </a:ext>
+            </a:extLst>
+          </p:cNvPr>
+          <p:cNvSpPr>
+            <a:spLocks noGrp="1" noRot="1" noChangeAspect="1" noMove="1" noResize="1" noEditPoints="1" noAdjustHandles="1" noChangeArrowheads="1" noChangeShapeType="1" noTextEdit="1"/>
+          </p:cNvSpPr>
+          <p:nvPr>
+            <p:extLst>
+              <p:ext uri="{386F3935-93C4-4BCD-93E2-E3B085C9AB24}">
+                <p16:designElem xmlns:p16="http://schemas.microsoft.com/office/powerpoint/2015/main" val="1"/>
+              </p:ext>
+            </p:extLst>
+          </p:nvPr>
+        </p:nvSpPr>
+        <p:spPr>
+          <a:xfrm>
+            <a:off x="0" y="4212708"/>
+            <a:ext cx="12192000" cy="2645291"/>
+          </a:xfrm>
+          <a:prstGeom prst="rect">
+            <a:avLst/>
+          </a:prstGeom>
+          <a:solidFill>
+            <a:schemeClr val="tx1">
+              <a:alpha val="88000"/>
+            </a:schemeClr>
+          </a:solidFill>
+          <a:ln>
+            <a:noFill/>
+          </a:ln>
+        </p:spPr>
+        <p:style>
+          <a:lnRef idx="2">
+            <a:schemeClr val="accent1">
+              <a:shade val="50000"/>
+            </a:schemeClr>
+          </a:lnRef>
+          <a:fillRef idx="1">
+            <a:schemeClr val="accent1"/>
+          </a:fillRef>
+          <a:effectRef idx="0">
+            <a:schemeClr val="accent1"/>
+          </a:effectRef>
+          <a:fontRef idx="minor">
+            <a:schemeClr val="lt1"/>
+          </a:fontRef>
+        </p:style>
+        <p:txBody>
+          <a:bodyPr rtlCol="0" anchor="ctr"/>
+          <a:lstStyle/>
+          <a:p>
+            <a:pPr algn="ctr"/>
+            <a:endParaRPr lang="en-US"/>
+          </a:p>
+        </p:txBody>
+      </p:sp>
+      <p:sp>
+        <p:nvSpPr>
+          <p:cNvPr id="2" name="Title 1">
+            <a:extLst>
+              <a:ext uri="{FF2B5EF4-FFF2-40B4-BE49-F238E27FC236}">
+                <a16:creationId xmlns:a16="http://schemas.microsoft.com/office/drawing/2014/main" id="{242B0E94-2D3F-4DE2-AC63-D3FF77FB30B3}"/>
+              </a:ext>
+            </a:extLst>
+          </p:cNvPr>
+          <p:cNvSpPr>
+            <a:spLocks noGrp="1"/>
+          </p:cNvSpPr>
+          <p:nvPr>
+            <p:ph type="title"/>
+          </p:nvPr>
+        </p:nvSpPr>
+        <p:spPr>
+          <a:xfrm>
+            <a:off x="961644" y="4585066"/>
+            <a:ext cx="10268712" cy="1169121"/>
+          </a:xfrm>
+        </p:spPr>
+        <p:txBody>
+          <a:bodyPr vert="horz" lIns="91440" tIns="45720" rIns="91440" bIns="45720" rtlCol="0" anchor="ctr">
+            <a:normAutofit/>
+          </a:bodyPr>
+          <a:lstStyle/>
+          <a:p>
+            <a:pPr algn="ctr"/>
+            <a:r>
+              <a:rPr lang="en-US" sz="7200" dirty="0"/>
+              <a:t>Stats</a:t>
+            </a:r>
+          </a:p>
+        </p:txBody>
+      </p:sp>
+      <p:pic>
+        <p:nvPicPr>
+          <p:cNvPr id="7" name="Picture 6" descr="Text&#10;&#10;Description automatically generated">
+            <a:extLst>
+              <a:ext uri="{FF2B5EF4-FFF2-40B4-BE49-F238E27FC236}">
+                <a16:creationId xmlns:a16="http://schemas.microsoft.com/office/drawing/2014/main" id="{63766E45-F47D-440D-B690-13DAA015F10D}"/>
+              </a:ext>
+            </a:extLst>
+          </p:cNvPr>
+          <p:cNvPicPr>
+            <a:picLocks noChangeAspect="1"/>
+          </p:cNvPicPr>
+          <p:nvPr/>
+        </p:nvPicPr>
+        <p:blipFill>
+          <a:blip r:embed="rId2">
+            <a:extLst>
+              <a:ext uri="{28A0092B-C50C-407E-A947-70E740481C1C}">
+                <a14:useLocalDpi xmlns:a14="http://schemas.microsoft.com/office/drawing/2010/main" val="0"/>
+              </a:ext>
+            </a:extLst>
+          </a:blip>
+          <a:stretch>
+            <a:fillRect/>
+          </a:stretch>
+        </p:blipFill>
+        <p:spPr>
+          <a:xfrm>
+            <a:off x="5424798" y="124202"/>
+            <a:ext cx="4573114" cy="4048331"/>
+          </a:xfrm>
+          <a:prstGeom prst="rect">
+            <a:avLst/>
+          </a:prstGeom>
+        </p:spPr>
+      </p:pic>
+      <p:pic>
+        <p:nvPicPr>
+          <p:cNvPr id="5" name="Content Placeholder 4" descr="Table&#10;&#10;Description automatically generated">
+            <a:extLst>
+              <a:ext uri="{FF2B5EF4-FFF2-40B4-BE49-F238E27FC236}">
+                <a16:creationId xmlns:a16="http://schemas.microsoft.com/office/drawing/2014/main" id="{0B06DA64-2AEF-4B0D-9947-A8B585A24A77}"/>
+              </a:ext>
+            </a:extLst>
+          </p:cNvPr>
+          <p:cNvPicPr>
+            <a:picLocks noGrp="1" noChangeAspect="1"/>
+          </p:cNvPicPr>
+          <p:nvPr>
+            <p:ph idx="1"/>
+          </p:nvPr>
+        </p:nvPicPr>
+        <p:blipFill>
+          <a:blip r:embed="rId3">
+            <a:extLst>
+              <a:ext uri="{28A0092B-C50C-407E-A947-70E740481C1C}">
+                <a14:useLocalDpi xmlns:a14="http://schemas.microsoft.com/office/drawing/2010/main" val="0"/>
+              </a:ext>
+            </a:extLst>
+          </a:blip>
+          <a:stretch>
+            <a:fillRect/>
+          </a:stretch>
+        </p:blipFill>
+        <p:spPr>
+          <a:xfrm>
+            <a:off x="652029" y="124267"/>
+            <a:ext cx="4573114" cy="3807118"/>
+          </a:xfrm>
+          <a:prstGeom prst="rect">
+            <a:avLst/>
+          </a:prstGeom>
+        </p:spPr>
+      </p:pic>
+    </p:spTree>
+    <p:extLst>
+      <p:ext uri="{BB962C8B-B14F-4D97-AF65-F5344CB8AC3E}">
+        <p14:creationId xmlns:p14="http://schemas.microsoft.com/office/powerpoint/2010/main" val="2623708154"/>
+      </p:ext>
+    </p:extLst>
+  </p:cSld>
+  <p:clrMapOvr>
+    <a:masterClrMapping/>
+  </p:clrMapOvr>
+</p:sld>
+</file>
+
+<file path=ppt/slides/slide14.xml><?xml version="1.0" encoding="utf-8"?>
+<p:sld xmlns:a="http://schemas.openxmlformats.org/drawingml/2006/main" xmlns:r="http://schemas.openxmlformats.org/officeDocument/2006/relationships" xmlns:p="http://schemas.openxmlformats.org/presentationml/2006/main">
+  <p:cSld>
+    <p:bg>
+      <p:bgPr>
+        <a:solidFill>
+          <a:schemeClr val="bg1"/>
+        </a:solidFill>
+        <a:effectLst/>
+      </p:bgPr>
+    </p:bg>
+    <p:spTree>
+      <p:nvGrpSpPr>
+        <p:cNvPr id="1" name=""/>
+        <p:cNvGrpSpPr/>
+        <p:nvPr/>
+      </p:nvGrpSpPr>
+      <p:grpSpPr>
+        <a:xfrm>
+          <a:off x="0" y="0"/>
+          <a:ext cx="0" cy="0"/>
+          <a:chOff x="0" y="0"/>
+          <a:chExt cx="0" cy="0"/>
+        </a:xfrm>
+      </p:grpSpPr>
+      <p:sp>
+        <p:nvSpPr>
           <p:cNvPr id="18" name="Rectangle 17">
             <a:extLst>
               <a:ext uri="{FF2B5EF4-FFF2-40B4-BE49-F238E27FC236}">
@@ -38101,7 +38501,7 @@
 </p:sld>
 </file>
 
-<file path=ppt/slides/slide14.xml><?xml version="1.0" encoding="utf-8"?>
+<file path=ppt/slides/slide15.xml><?xml version="1.0" encoding="utf-8"?>
 <p:sld xmlns:a="http://schemas.openxmlformats.org/drawingml/2006/main" xmlns:r="http://schemas.openxmlformats.org/officeDocument/2006/relationships" xmlns:p="http://schemas.openxmlformats.org/presentationml/2006/main">
   <p:cSld>
     <p:spTree>
@@ -38222,7 +38622,7 @@
                 <a:tabLst/>
                 <a:defRPr/>
               </a:pPr>
-              <a:t>14</a:t>
+              <a:t>15</a:t>
             </a:fld>
             <a:endParaRPr kumimoji="0" lang="en-US" b="0" i="0" u="none" strike="noStrike" cap="none" spc="0" normalizeH="0" baseline="0">
               <a:ln>
@@ -38702,7 +39102,7 @@
 </p:sld>
 </file>
 
-<file path=ppt/slides/slide15.xml><?xml version="1.0" encoding="utf-8"?>
+<file path=ppt/slides/slide16.xml><?xml version="1.0" encoding="utf-8"?>
 <p:sld xmlns:a="http://schemas.openxmlformats.org/drawingml/2006/main" xmlns:r="http://schemas.openxmlformats.org/officeDocument/2006/relationships" xmlns:p="http://schemas.openxmlformats.org/presentationml/2006/main">
   <p:cSld>
     <p:bg>
@@ -38997,7 +39397,7 @@
 </p:sld>
 </file>
 
-<file path=ppt/slides/slide16.xml><?xml version="1.0" encoding="utf-8"?>
+<file path=ppt/slides/slide17.xml><?xml version="1.0" encoding="utf-8"?>
 <p:sld xmlns:a="http://schemas.openxmlformats.org/drawingml/2006/main" xmlns:r="http://schemas.openxmlformats.org/officeDocument/2006/relationships" xmlns:p="http://schemas.openxmlformats.org/presentationml/2006/main">
   <p:cSld>
     <p:spTree>
@@ -39315,7 +39715,7 @@
 </p:sld>
 </file>
 
-<file path=ppt/slides/slide17.xml><?xml version="1.0" encoding="utf-8"?>
+<file path=ppt/slides/slide18.xml><?xml version="1.0" encoding="utf-8"?>
 <p:sld xmlns:a="http://schemas.openxmlformats.org/drawingml/2006/main" xmlns:r="http://schemas.openxmlformats.org/officeDocument/2006/relationships" xmlns:p="http://schemas.openxmlformats.org/presentationml/2006/main">
   <p:cSld>
     <p:spTree>
@@ -39528,7 +39928,7 @@
 </p:sld>
 </file>
 
-<file path=ppt/slides/slide18.xml><?xml version="1.0" encoding="utf-8"?>
+<file path=ppt/slides/slide19.xml><?xml version="1.0" encoding="utf-8"?>
 <p:sld xmlns:a="http://schemas.openxmlformats.org/drawingml/2006/main" xmlns:r="http://schemas.openxmlformats.org/officeDocument/2006/relationships" xmlns:p="http://schemas.openxmlformats.org/presentationml/2006/main">
   <p:cSld>
     <p:spTree>
@@ -39650,301 +40050,6 @@
     <p:extLst>
       <p:ext uri="{BB962C8B-B14F-4D97-AF65-F5344CB8AC3E}">
         <p14:creationId xmlns:p14="http://schemas.microsoft.com/office/powerpoint/2010/main" val="1993694396"/>
-      </p:ext>
-    </p:extLst>
-  </p:cSld>
-  <p:clrMapOvr>
-    <a:masterClrMapping/>
-  </p:clrMapOvr>
-</p:sld>
-</file>
-
-<file path=ppt/slides/slide19.xml><?xml version="1.0" encoding="utf-8"?>
-<p:sld xmlns:a="http://schemas.openxmlformats.org/drawingml/2006/main" xmlns:r="http://schemas.openxmlformats.org/officeDocument/2006/relationships" xmlns:p="http://schemas.openxmlformats.org/presentationml/2006/main">
-  <p:cSld>
-    <p:bg>
-      <p:bgPr>
-        <a:solidFill>
-          <a:schemeClr val="bg1"/>
-        </a:solidFill>
-        <a:effectLst/>
-      </p:bgPr>
-    </p:bg>
-    <p:spTree>
-      <p:nvGrpSpPr>
-        <p:cNvPr id="1" name=""/>
-        <p:cNvGrpSpPr/>
-        <p:nvPr/>
-      </p:nvGrpSpPr>
-      <p:grpSpPr>
-        <a:xfrm>
-          <a:off x="0" y="0"/>
-          <a:ext cx="0" cy="0"/>
-          <a:chOff x="0" y="0"/>
-          <a:chExt cx="0" cy="0"/>
-        </a:xfrm>
-      </p:grpSpPr>
-      <p:sp>
-        <p:nvSpPr>
-          <p:cNvPr id="9" name="Rectangle 8">
-            <a:extLst>
-              <a:ext uri="{FF2B5EF4-FFF2-40B4-BE49-F238E27FC236}">
-                <a16:creationId xmlns:a16="http://schemas.microsoft.com/office/drawing/2014/main" id="{09A1C012-8297-4361-ACE8-A2509FB18911}"/>
-              </a:ext>
-              <a:ext uri="{C183D7F6-B498-43B3-948B-1728B52AA6E4}">
-                <adec:decorative xmlns:adec="http://schemas.microsoft.com/office/drawing/2017/decorative" val="1"/>
-              </a:ext>
-            </a:extLst>
-          </p:cNvPr>
-          <p:cNvSpPr>
-            <a:spLocks noGrp="1" noRot="1" noChangeAspect="1" noMove="1" noResize="1" noEditPoints="1" noAdjustHandles="1" noChangeArrowheads="1" noChangeShapeType="1" noTextEdit="1"/>
-          </p:cNvSpPr>
-          <p:nvPr>
-            <p:extLst>
-              <p:ext uri="{386F3935-93C4-4BCD-93E2-E3B085C9AB24}">
-                <p16:designElem xmlns:p16="http://schemas.microsoft.com/office/powerpoint/2015/main" val="1"/>
-              </p:ext>
-            </p:extLst>
-          </p:nvPr>
-        </p:nvSpPr>
-        <p:spPr>
-          <a:xfrm>
-            <a:off x="0" y="4206240"/>
-            <a:ext cx="12192000" cy="2651760"/>
-          </a:xfrm>
-          <a:prstGeom prst="rect">
-            <a:avLst/>
-          </a:prstGeom>
-          <a:solidFill>
-            <a:schemeClr val="tx1"/>
-          </a:solidFill>
-          <a:ln>
-            <a:noFill/>
-          </a:ln>
-        </p:spPr>
-        <p:style>
-          <a:lnRef idx="2">
-            <a:schemeClr val="accent1">
-              <a:shade val="50000"/>
-            </a:schemeClr>
-          </a:lnRef>
-          <a:fillRef idx="1">
-            <a:schemeClr val="accent1"/>
-          </a:fillRef>
-          <a:effectRef idx="0">
-            <a:schemeClr val="accent1"/>
-          </a:effectRef>
-          <a:fontRef idx="minor">
-            <a:schemeClr val="lt1"/>
-          </a:fontRef>
-        </p:style>
-        <p:txBody>
-          <a:bodyPr rtlCol="0" anchor="ctr"/>
-          <a:lstStyle/>
-          <a:p>
-            <a:pPr algn="ctr"/>
-            <a:endParaRPr lang="en-US"/>
-          </a:p>
-        </p:txBody>
-      </p:sp>
-      <p:sp useBgFill="1">
-        <p:nvSpPr>
-          <p:cNvPr id="11" name="Rectangle 10">
-            <a:extLst>
-              <a:ext uri="{FF2B5EF4-FFF2-40B4-BE49-F238E27FC236}">
-                <a16:creationId xmlns:a16="http://schemas.microsoft.com/office/drawing/2014/main" id="{4AA13AD3-0A4F-475A-BEBB-DEEFF5C096C3}"/>
-              </a:ext>
-              <a:ext uri="{C183D7F6-B498-43B3-948B-1728B52AA6E4}">
-                <adec:decorative xmlns:adec="http://schemas.microsoft.com/office/drawing/2017/decorative" val="1"/>
-              </a:ext>
-            </a:extLst>
-          </p:cNvPr>
-          <p:cNvSpPr>
-            <a:spLocks noGrp="1" noRot="1" noChangeAspect="1" noMove="1" noResize="1" noEditPoints="1" noAdjustHandles="1" noChangeArrowheads="1" noChangeShapeType="1" noTextEdit="1"/>
-          </p:cNvSpPr>
-          <p:nvPr>
-            <p:extLst>
-              <p:ext uri="{386F3935-93C4-4BCD-93E2-E3B085C9AB24}">
-                <p16:designElem xmlns:p16="http://schemas.microsoft.com/office/powerpoint/2015/main" val="1"/>
-              </p:ext>
-            </p:extLst>
-          </p:nvPr>
-        </p:nvSpPr>
-        <p:spPr>
-          <a:xfrm>
-            <a:off x="0" y="0"/>
-            <a:ext cx="12192000" cy="6858000"/>
-          </a:xfrm>
-          <a:prstGeom prst="rect">
-            <a:avLst/>
-          </a:prstGeom>
-          <a:ln>
-            <a:noFill/>
-          </a:ln>
-        </p:spPr>
-        <p:style>
-          <a:lnRef idx="2">
-            <a:schemeClr val="accent1">
-              <a:shade val="50000"/>
-            </a:schemeClr>
-          </a:lnRef>
-          <a:fillRef idx="1">
-            <a:schemeClr val="accent1"/>
-          </a:fillRef>
-          <a:effectRef idx="0">
-            <a:schemeClr val="accent1"/>
-          </a:effectRef>
-          <a:fontRef idx="minor">
-            <a:schemeClr val="lt1"/>
-          </a:fontRef>
-        </p:style>
-        <p:txBody>
-          <a:bodyPr rtlCol="0" anchor="ctr"/>
-          <a:lstStyle/>
-          <a:p>
-            <a:pPr algn="ctr"/>
-            <a:endParaRPr lang="en-US"/>
-          </a:p>
-        </p:txBody>
-      </p:sp>
-      <p:pic>
-        <p:nvPicPr>
-          <p:cNvPr id="5" name="Picture 4" descr="Many question marks on black background">
-            <a:extLst>
-              <a:ext uri="{FF2B5EF4-FFF2-40B4-BE49-F238E27FC236}">
-                <a16:creationId xmlns:a16="http://schemas.microsoft.com/office/drawing/2014/main" id="{E653F40F-3F42-4B45-85E2-4D8F11F53964}"/>
-              </a:ext>
-            </a:extLst>
-          </p:cNvPr>
-          <p:cNvPicPr>
-            <a:picLocks noChangeAspect="1"/>
-          </p:cNvPicPr>
-          <p:nvPr/>
-        </p:nvPicPr>
-        <p:blipFill rotWithShape="1">
-          <a:blip r:embed="rId3"/>
-          <a:srcRect t="7787"/>
-          <a:stretch/>
-        </p:blipFill>
-        <p:spPr>
-          <a:xfrm>
-            <a:off x="20" y="10"/>
-            <a:ext cx="12191980" cy="6857990"/>
-          </a:xfrm>
-          <a:prstGeom prst="rect">
-            <a:avLst/>
-          </a:prstGeom>
-        </p:spPr>
-      </p:pic>
-      <p:sp>
-        <p:nvSpPr>
-          <p:cNvPr id="13" name="Rectangle 12">
-            <a:extLst>
-              <a:ext uri="{FF2B5EF4-FFF2-40B4-BE49-F238E27FC236}">
-                <a16:creationId xmlns:a16="http://schemas.microsoft.com/office/drawing/2014/main" id="{1C2F3FA0-960A-435A-AC72-8ADCBF50F7D2}"/>
-              </a:ext>
-              <a:ext uri="{C183D7F6-B498-43B3-948B-1728B52AA6E4}">
-                <adec:decorative xmlns:adec="http://schemas.microsoft.com/office/drawing/2017/decorative" val="1"/>
-              </a:ext>
-            </a:extLst>
-          </p:cNvPr>
-          <p:cNvSpPr>
-            <a:spLocks noGrp="1" noRot="1" noChangeAspect="1" noMove="1" noResize="1" noEditPoints="1" noAdjustHandles="1" noChangeArrowheads="1" noChangeShapeType="1" noTextEdit="1"/>
-          </p:cNvSpPr>
-          <p:nvPr>
-            <p:extLst>
-              <p:ext uri="{386F3935-93C4-4BCD-93E2-E3B085C9AB24}">
-                <p16:designElem xmlns:p16="http://schemas.microsoft.com/office/powerpoint/2015/main" val="1"/>
-              </p:ext>
-            </p:extLst>
-          </p:nvPr>
-        </p:nvSpPr>
-        <p:spPr>
-          <a:xfrm>
-            <a:off x="0" y="4551139"/>
-            <a:ext cx="12192000" cy="1644556"/>
-          </a:xfrm>
-          <a:prstGeom prst="rect">
-            <a:avLst/>
-          </a:prstGeom>
-          <a:solidFill>
-            <a:schemeClr val="tx1">
-              <a:alpha val="70000"/>
-            </a:schemeClr>
-          </a:solidFill>
-          <a:ln>
-            <a:noFill/>
-          </a:ln>
-        </p:spPr>
-        <p:style>
-          <a:lnRef idx="2">
-            <a:schemeClr val="accent1">
-              <a:shade val="50000"/>
-            </a:schemeClr>
-          </a:lnRef>
-          <a:fillRef idx="1">
-            <a:schemeClr val="accent1"/>
-          </a:fillRef>
-          <a:effectRef idx="0">
-            <a:schemeClr val="accent1"/>
-          </a:effectRef>
-          <a:fontRef idx="minor">
-            <a:schemeClr val="lt1"/>
-          </a:fontRef>
-        </p:style>
-        <p:txBody>
-          <a:bodyPr rtlCol="0" anchor="ctr"/>
-          <a:lstStyle/>
-          <a:p>
-            <a:pPr algn="ctr"/>
-            <a:endParaRPr lang="en-US"/>
-          </a:p>
-        </p:txBody>
-      </p:sp>
-      <p:sp>
-        <p:nvSpPr>
-          <p:cNvPr id="2" name="Title 1">
-            <a:extLst>
-              <a:ext uri="{FF2B5EF4-FFF2-40B4-BE49-F238E27FC236}">
-                <a16:creationId xmlns:a16="http://schemas.microsoft.com/office/drawing/2014/main" id="{15FE822C-60EB-48CF-8BCA-2E6564BDB329}"/>
-              </a:ext>
-            </a:extLst>
-          </p:cNvPr>
-          <p:cNvSpPr>
-            <a:spLocks noGrp="1"/>
-          </p:cNvSpPr>
-          <p:nvPr>
-            <p:ph type="title"/>
-          </p:nvPr>
-        </p:nvSpPr>
-        <p:spPr>
-          <a:xfrm>
-            <a:off x="961644" y="4675366"/>
-            <a:ext cx="10268712" cy="846223"/>
-          </a:xfrm>
-        </p:spPr>
-        <p:txBody>
-          <a:bodyPr vert="horz" lIns="91440" tIns="45720" rIns="91440" bIns="45720" rtlCol="0" anchor="b">
-            <a:normAutofit/>
-          </a:bodyPr>
-          <a:lstStyle/>
-          <a:p>
-            <a:pPr algn="ctr"/>
-            <a:r>
-              <a:rPr lang="en-US" sz="5400" dirty="0">
-                <a:solidFill>
-                  <a:srgbClr val="FFFFFF"/>
-                </a:solidFill>
-              </a:rPr>
-              <a:t>Questions?</a:t>
-            </a:r>
-          </a:p>
-        </p:txBody>
-      </p:sp>
-    </p:spTree>
-    <p:extLst>
-      <p:ext uri="{BB962C8B-B14F-4D97-AF65-F5344CB8AC3E}">
-        <p14:creationId xmlns:p14="http://schemas.microsoft.com/office/powerpoint/2010/main" val="1701684088"/>
       </p:ext>
     </p:extLst>
   </p:cSld>
@@ -40240,6 +40345,301 @@
     <p:extLst>
       <p:ext uri="{BB962C8B-B14F-4D97-AF65-F5344CB8AC3E}">
         <p14:creationId xmlns:p14="http://schemas.microsoft.com/office/powerpoint/2010/main" val="1056705280"/>
+      </p:ext>
+    </p:extLst>
+  </p:cSld>
+  <p:clrMapOvr>
+    <a:masterClrMapping/>
+  </p:clrMapOvr>
+</p:sld>
+</file>
+
+<file path=ppt/slides/slide20.xml><?xml version="1.0" encoding="utf-8"?>
+<p:sld xmlns:a="http://schemas.openxmlformats.org/drawingml/2006/main" xmlns:r="http://schemas.openxmlformats.org/officeDocument/2006/relationships" xmlns:p="http://schemas.openxmlformats.org/presentationml/2006/main">
+  <p:cSld>
+    <p:bg>
+      <p:bgPr>
+        <a:solidFill>
+          <a:schemeClr val="bg1"/>
+        </a:solidFill>
+        <a:effectLst/>
+      </p:bgPr>
+    </p:bg>
+    <p:spTree>
+      <p:nvGrpSpPr>
+        <p:cNvPr id="1" name=""/>
+        <p:cNvGrpSpPr/>
+        <p:nvPr/>
+      </p:nvGrpSpPr>
+      <p:grpSpPr>
+        <a:xfrm>
+          <a:off x="0" y="0"/>
+          <a:ext cx="0" cy="0"/>
+          <a:chOff x="0" y="0"/>
+          <a:chExt cx="0" cy="0"/>
+        </a:xfrm>
+      </p:grpSpPr>
+      <p:sp>
+        <p:nvSpPr>
+          <p:cNvPr id="9" name="Rectangle 8">
+            <a:extLst>
+              <a:ext uri="{FF2B5EF4-FFF2-40B4-BE49-F238E27FC236}">
+                <a16:creationId xmlns:a16="http://schemas.microsoft.com/office/drawing/2014/main" id="{09A1C012-8297-4361-ACE8-A2509FB18911}"/>
+              </a:ext>
+              <a:ext uri="{C183D7F6-B498-43B3-948B-1728B52AA6E4}">
+                <adec:decorative xmlns:adec="http://schemas.microsoft.com/office/drawing/2017/decorative" val="1"/>
+              </a:ext>
+            </a:extLst>
+          </p:cNvPr>
+          <p:cNvSpPr>
+            <a:spLocks noGrp="1" noRot="1" noChangeAspect="1" noMove="1" noResize="1" noEditPoints="1" noAdjustHandles="1" noChangeArrowheads="1" noChangeShapeType="1" noTextEdit="1"/>
+          </p:cNvSpPr>
+          <p:nvPr>
+            <p:extLst>
+              <p:ext uri="{386F3935-93C4-4BCD-93E2-E3B085C9AB24}">
+                <p16:designElem xmlns:p16="http://schemas.microsoft.com/office/powerpoint/2015/main" val="1"/>
+              </p:ext>
+            </p:extLst>
+          </p:nvPr>
+        </p:nvSpPr>
+        <p:spPr>
+          <a:xfrm>
+            <a:off x="0" y="4206240"/>
+            <a:ext cx="12192000" cy="2651760"/>
+          </a:xfrm>
+          <a:prstGeom prst="rect">
+            <a:avLst/>
+          </a:prstGeom>
+          <a:solidFill>
+            <a:schemeClr val="tx1"/>
+          </a:solidFill>
+          <a:ln>
+            <a:noFill/>
+          </a:ln>
+        </p:spPr>
+        <p:style>
+          <a:lnRef idx="2">
+            <a:schemeClr val="accent1">
+              <a:shade val="50000"/>
+            </a:schemeClr>
+          </a:lnRef>
+          <a:fillRef idx="1">
+            <a:schemeClr val="accent1"/>
+          </a:fillRef>
+          <a:effectRef idx="0">
+            <a:schemeClr val="accent1"/>
+          </a:effectRef>
+          <a:fontRef idx="minor">
+            <a:schemeClr val="lt1"/>
+          </a:fontRef>
+        </p:style>
+        <p:txBody>
+          <a:bodyPr rtlCol="0" anchor="ctr"/>
+          <a:lstStyle/>
+          <a:p>
+            <a:pPr algn="ctr"/>
+            <a:endParaRPr lang="en-US"/>
+          </a:p>
+        </p:txBody>
+      </p:sp>
+      <p:sp useBgFill="1">
+        <p:nvSpPr>
+          <p:cNvPr id="11" name="Rectangle 10">
+            <a:extLst>
+              <a:ext uri="{FF2B5EF4-FFF2-40B4-BE49-F238E27FC236}">
+                <a16:creationId xmlns:a16="http://schemas.microsoft.com/office/drawing/2014/main" id="{4AA13AD3-0A4F-475A-BEBB-DEEFF5C096C3}"/>
+              </a:ext>
+              <a:ext uri="{C183D7F6-B498-43B3-948B-1728B52AA6E4}">
+                <adec:decorative xmlns:adec="http://schemas.microsoft.com/office/drawing/2017/decorative" val="1"/>
+              </a:ext>
+            </a:extLst>
+          </p:cNvPr>
+          <p:cNvSpPr>
+            <a:spLocks noGrp="1" noRot="1" noChangeAspect="1" noMove="1" noResize="1" noEditPoints="1" noAdjustHandles="1" noChangeArrowheads="1" noChangeShapeType="1" noTextEdit="1"/>
+          </p:cNvSpPr>
+          <p:nvPr>
+            <p:extLst>
+              <p:ext uri="{386F3935-93C4-4BCD-93E2-E3B085C9AB24}">
+                <p16:designElem xmlns:p16="http://schemas.microsoft.com/office/powerpoint/2015/main" val="1"/>
+              </p:ext>
+            </p:extLst>
+          </p:nvPr>
+        </p:nvSpPr>
+        <p:spPr>
+          <a:xfrm>
+            <a:off x="0" y="0"/>
+            <a:ext cx="12192000" cy="6858000"/>
+          </a:xfrm>
+          <a:prstGeom prst="rect">
+            <a:avLst/>
+          </a:prstGeom>
+          <a:ln>
+            <a:noFill/>
+          </a:ln>
+        </p:spPr>
+        <p:style>
+          <a:lnRef idx="2">
+            <a:schemeClr val="accent1">
+              <a:shade val="50000"/>
+            </a:schemeClr>
+          </a:lnRef>
+          <a:fillRef idx="1">
+            <a:schemeClr val="accent1"/>
+          </a:fillRef>
+          <a:effectRef idx="0">
+            <a:schemeClr val="accent1"/>
+          </a:effectRef>
+          <a:fontRef idx="minor">
+            <a:schemeClr val="lt1"/>
+          </a:fontRef>
+        </p:style>
+        <p:txBody>
+          <a:bodyPr rtlCol="0" anchor="ctr"/>
+          <a:lstStyle/>
+          <a:p>
+            <a:pPr algn="ctr"/>
+            <a:endParaRPr lang="en-US"/>
+          </a:p>
+        </p:txBody>
+      </p:sp>
+      <p:pic>
+        <p:nvPicPr>
+          <p:cNvPr id="5" name="Picture 4" descr="Many question marks on black background">
+            <a:extLst>
+              <a:ext uri="{FF2B5EF4-FFF2-40B4-BE49-F238E27FC236}">
+                <a16:creationId xmlns:a16="http://schemas.microsoft.com/office/drawing/2014/main" id="{E653F40F-3F42-4B45-85E2-4D8F11F53964}"/>
+              </a:ext>
+            </a:extLst>
+          </p:cNvPr>
+          <p:cNvPicPr>
+            <a:picLocks noChangeAspect="1"/>
+          </p:cNvPicPr>
+          <p:nvPr/>
+        </p:nvPicPr>
+        <p:blipFill rotWithShape="1">
+          <a:blip r:embed="rId3"/>
+          <a:srcRect t="7787"/>
+          <a:stretch/>
+        </p:blipFill>
+        <p:spPr>
+          <a:xfrm>
+            <a:off x="20" y="10"/>
+            <a:ext cx="12191980" cy="6857990"/>
+          </a:xfrm>
+          <a:prstGeom prst="rect">
+            <a:avLst/>
+          </a:prstGeom>
+        </p:spPr>
+      </p:pic>
+      <p:sp>
+        <p:nvSpPr>
+          <p:cNvPr id="13" name="Rectangle 12">
+            <a:extLst>
+              <a:ext uri="{FF2B5EF4-FFF2-40B4-BE49-F238E27FC236}">
+                <a16:creationId xmlns:a16="http://schemas.microsoft.com/office/drawing/2014/main" id="{1C2F3FA0-960A-435A-AC72-8ADCBF50F7D2}"/>
+              </a:ext>
+              <a:ext uri="{C183D7F6-B498-43B3-948B-1728B52AA6E4}">
+                <adec:decorative xmlns:adec="http://schemas.microsoft.com/office/drawing/2017/decorative" val="1"/>
+              </a:ext>
+            </a:extLst>
+          </p:cNvPr>
+          <p:cNvSpPr>
+            <a:spLocks noGrp="1" noRot="1" noChangeAspect="1" noMove="1" noResize="1" noEditPoints="1" noAdjustHandles="1" noChangeArrowheads="1" noChangeShapeType="1" noTextEdit="1"/>
+          </p:cNvSpPr>
+          <p:nvPr>
+            <p:extLst>
+              <p:ext uri="{386F3935-93C4-4BCD-93E2-E3B085C9AB24}">
+                <p16:designElem xmlns:p16="http://schemas.microsoft.com/office/powerpoint/2015/main" val="1"/>
+              </p:ext>
+            </p:extLst>
+          </p:nvPr>
+        </p:nvSpPr>
+        <p:spPr>
+          <a:xfrm>
+            <a:off x="0" y="4551139"/>
+            <a:ext cx="12192000" cy="1644556"/>
+          </a:xfrm>
+          <a:prstGeom prst="rect">
+            <a:avLst/>
+          </a:prstGeom>
+          <a:solidFill>
+            <a:schemeClr val="tx1">
+              <a:alpha val="70000"/>
+            </a:schemeClr>
+          </a:solidFill>
+          <a:ln>
+            <a:noFill/>
+          </a:ln>
+        </p:spPr>
+        <p:style>
+          <a:lnRef idx="2">
+            <a:schemeClr val="accent1">
+              <a:shade val="50000"/>
+            </a:schemeClr>
+          </a:lnRef>
+          <a:fillRef idx="1">
+            <a:schemeClr val="accent1"/>
+          </a:fillRef>
+          <a:effectRef idx="0">
+            <a:schemeClr val="accent1"/>
+          </a:effectRef>
+          <a:fontRef idx="minor">
+            <a:schemeClr val="lt1"/>
+          </a:fontRef>
+        </p:style>
+        <p:txBody>
+          <a:bodyPr rtlCol="0" anchor="ctr"/>
+          <a:lstStyle/>
+          <a:p>
+            <a:pPr algn="ctr"/>
+            <a:endParaRPr lang="en-US"/>
+          </a:p>
+        </p:txBody>
+      </p:sp>
+      <p:sp>
+        <p:nvSpPr>
+          <p:cNvPr id="2" name="Title 1">
+            <a:extLst>
+              <a:ext uri="{FF2B5EF4-FFF2-40B4-BE49-F238E27FC236}">
+                <a16:creationId xmlns:a16="http://schemas.microsoft.com/office/drawing/2014/main" id="{15FE822C-60EB-48CF-8BCA-2E6564BDB329}"/>
+              </a:ext>
+            </a:extLst>
+          </p:cNvPr>
+          <p:cNvSpPr>
+            <a:spLocks noGrp="1"/>
+          </p:cNvSpPr>
+          <p:nvPr>
+            <p:ph type="title"/>
+          </p:nvPr>
+        </p:nvSpPr>
+        <p:spPr>
+          <a:xfrm>
+            <a:off x="961644" y="4675366"/>
+            <a:ext cx="10268712" cy="846223"/>
+          </a:xfrm>
+        </p:spPr>
+        <p:txBody>
+          <a:bodyPr vert="horz" lIns="91440" tIns="45720" rIns="91440" bIns="45720" rtlCol="0" anchor="b">
+            <a:normAutofit/>
+          </a:bodyPr>
+          <a:lstStyle/>
+          <a:p>
+            <a:pPr algn="ctr"/>
+            <a:r>
+              <a:rPr lang="en-US" sz="5400" dirty="0">
+                <a:solidFill>
+                  <a:srgbClr val="FFFFFF"/>
+                </a:solidFill>
+              </a:rPr>
+              <a:t>Questions?</a:t>
+            </a:r>
+          </a:p>
+        </p:txBody>
+      </p:sp>
+    </p:spTree>
+    <p:extLst>
+      <p:ext uri="{BB962C8B-B14F-4D97-AF65-F5344CB8AC3E}">
+        <p14:creationId xmlns:p14="http://schemas.microsoft.com/office/powerpoint/2010/main" val="1701684088"/>
       </p:ext>
     </p:extLst>
   </p:cSld>

</xml_diff>